<commit_message>
j'ai retiré mon numéro de téléphone de l'application et avancé la diapo
</commit_message>
<xml_diff>
--- a/cours/Irondelle.pptx
+++ b/cours/Irondelle.pptx
@@ -12,9 +12,12 @@
     <p:sldId id="260" r:id="rId6"/>
     <p:sldId id="261" r:id="rId7"/>
     <p:sldId id="262" r:id="rId8"/>
-    <p:sldId id="263" r:id="rId9"/>
-    <p:sldId id="264" r:id="rId10"/>
-    <p:sldId id="265" r:id="rId11"/>
+    <p:sldId id="266" r:id="rId9"/>
+    <p:sldId id="263" r:id="rId10"/>
+    <p:sldId id="264" r:id="rId11"/>
+    <p:sldId id="267" r:id="rId12"/>
+    <p:sldId id="268" r:id="rId13"/>
+    <p:sldId id="265" r:id="rId14"/>
   </p:sldIdLst>
   <p:sldSz cx="12192000" cy="6858000"/>
   <p:notesSz cx="6858000" cy="9144000"/>
@@ -1336,9 +1339,9 @@
           <a:p>
             <a:fld id="{065F3140-87E1-4878-A2FB-1306ED21F06D}" type="datetimeFigureOut">
               <a:rPr lang="fr-FR" smtClean="0"/>
-              <a:t>19/01/2018</a:t>
+              <a:t>22/01/2018</a:t>
             </a:fld>
-            <a:endParaRPr lang="fr-FR"/>
+            <a:endParaRPr lang="fr-FR" dirty="0"/>
           </a:p>
         </p:txBody>
       </p:sp>
@@ -1372,7 +1375,7 @@
             </a:lvl1pPr>
           </a:lstStyle>
           <a:p>
-            <a:endParaRPr lang="fr-FR"/>
+            <a:endParaRPr lang="fr-FR" dirty="0"/>
           </a:p>
         </p:txBody>
       </p:sp>
@@ -1410,7 +1413,7 @@
               <a:rPr lang="fr-FR" smtClean="0"/>
               <a:t>‹N°›</a:t>
             </a:fld>
-            <a:endParaRPr lang="fr-FR"/>
+            <a:endParaRPr lang="fr-FR" dirty="0"/>
           </a:p>
         </p:txBody>
       </p:sp>
@@ -1574,9 +1577,9 @@
           <a:p>
             <a:fld id="{065F3140-87E1-4878-A2FB-1306ED21F06D}" type="datetimeFigureOut">
               <a:rPr lang="fr-FR" smtClean="0"/>
-              <a:t>19/01/2018</a:t>
+              <a:t>22/01/2018</a:t>
             </a:fld>
-            <a:endParaRPr lang="fr-FR"/>
+            <a:endParaRPr lang="fr-FR" dirty="0"/>
           </a:p>
         </p:txBody>
       </p:sp>
@@ -1595,7 +1598,7 @@
           <a:bodyPr/>
           <a:lstStyle/>
           <a:p>
-            <a:endParaRPr lang="fr-FR"/>
+            <a:endParaRPr lang="fr-FR" dirty="0"/>
           </a:p>
         </p:txBody>
       </p:sp>
@@ -1618,7 +1621,7 @@
               <a:rPr lang="fr-FR" smtClean="0"/>
               <a:t>‹N°›</a:t>
             </a:fld>
-            <a:endParaRPr lang="fr-FR"/>
+            <a:endParaRPr lang="fr-FR" dirty="0"/>
           </a:p>
         </p:txBody>
       </p:sp>
@@ -1754,9 +1757,9 @@
           <a:p>
             <a:fld id="{065F3140-87E1-4878-A2FB-1306ED21F06D}" type="datetimeFigureOut">
               <a:rPr lang="fr-FR" smtClean="0"/>
-              <a:t>19/01/2018</a:t>
+              <a:t>22/01/2018</a:t>
             </a:fld>
-            <a:endParaRPr lang="fr-FR"/>
+            <a:endParaRPr lang="fr-FR" dirty="0"/>
           </a:p>
         </p:txBody>
       </p:sp>
@@ -1775,7 +1778,7 @@
           <a:bodyPr/>
           <a:lstStyle/>
           <a:p>
-            <a:endParaRPr lang="fr-FR"/>
+            <a:endParaRPr lang="fr-FR" dirty="0"/>
           </a:p>
         </p:txBody>
       </p:sp>
@@ -1798,7 +1801,7 @@
               <a:rPr lang="fr-FR" smtClean="0"/>
               <a:t>‹N°›</a:t>
             </a:fld>
-            <a:endParaRPr lang="fr-FR"/>
+            <a:endParaRPr lang="fr-FR" dirty="0"/>
           </a:p>
         </p:txBody>
       </p:sp>
@@ -1924,9 +1927,9 @@
           <a:p>
             <a:fld id="{065F3140-87E1-4878-A2FB-1306ED21F06D}" type="datetimeFigureOut">
               <a:rPr lang="fr-FR" smtClean="0"/>
-              <a:t>19/01/2018</a:t>
+              <a:t>22/01/2018</a:t>
             </a:fld>
-            <a:endParaRPr lang="fr-FR"/>
+            <a:endParaRPr lang="fr-FR" dirty="0"/>
           </a:p>
         </p:txBody>
       </p:sp>
@@ -1945,7 +1948,7 @@
           <a:bodyPr/>
           <a:lstStyle/>
           <a:p>
-            <a:endParaRPr lang="fr-FR"/>
+            <a:endParaRPr lang="fr-FR" dirty="0"/>
           </a:p>
         </p:txBody>
       </p:sp>
@@ -1968,7 +1971,7 @@
               <a:rPr lang="fr-FR" smtClean="0"/>
               <a:t>‹N°›</a:t>
             </a:fld>
-            <a:endParaRPr lang="fr-FR"/>
+            <a:endParaRPr lang="fr-FR" dirty="0"/>
           </a:p>
         </p:txBody>
       </p:sp>
@@ -2197,9 +2200,9 @@
           <a:p>
             <a:fld id="{065F3140-87E1-4878-A2FB-1306ED21F06D}" type="datetimeFigureOut">
               <a:rPr lang="fr-FR" smtClean="0"/>
-              <a:t>19/01/2018</a:t>
+              <a:t>22/01/2018</a:t>
             </a:fld>
-            <a:endParaRPr lang="fr-FR"/>
+            <a:endParaRPr lang="fr-FR" dirty="0"/>
           </a:p>
         </p:txBody>
       </p:sp>
@@ -2231,7 +2234,7 @@
             </a:lvl1pPr>
           </a:lstStyle>
           <a:p>
-            <a:endParaRPr lang="fr-FR"/>
+            <a:endParaRPr lang="fr-FR" dirty="0"/>
           </a:p>
         </p:txBody>
       </p:sp>
@@ -2267,7 +2270,7 @@
               <a:rPr lang="fr-FR" smtClean="0"/>
               <a:t>‹N°›</a:t>
             </a:fld>
-            <a:endParaRPr lang="fr-FR"/>
+            <a:endParaRPr lang="fr-FR" dirty="0"/>
           </a:p>
         </p:txBody>
       </p:sp>
@@ -3398,9 +3401,9 @@
           <a:p>
             <a:fld id="{065F3140-87E1-4878-A2FB-1306ED21F06D}" type="datetimeFigureOut">
               <a:rPr lang="fr-FR" smtClean="0"/>
-              <a:t>19/01/2018</a:t>
+              <a:t>22/01/2018</a:t>
             </a:fld>
-            <a:endParaRPr lang="fr-FR"/>
+            <a:endParaRPr lang="fr-FR" dirty="0"/>
           </a:p>
         </p:txBody>
       </p:sp>
@@ -3419,7 +3422,7 @@
           <a:bodyPr/>
           <a:lstStyle/>
           <a:p>
-            <a:endParaRPr lang="fr-FR"/>
+            <a:endParaRPr lang="fr-FR" dirty="0"/>
           </a:p>
         </p:txBody>
       </p:sp>
@@ -3442,7 +3445,7 @@
               <a:rPr lang="fr-FR" smtClean="0"/>
               <a:t>‹N°›</a:t>
             </a:fld>
-            <a:endParaRPr lang="fr-FR"/>
+            <a:endParaRPr lang="fr-FR" dirty="0"/>
           </a:p>
         </p:txBody>
       </p:sp>
@@ -3788,9 +3791,9 @@
           <a:p>
             <a:fld id="{065F3140-87E1-4878-A2FB-1306ED21F06D}" type="datetimeFigureOut">
               <a:rPr lang="fr-FR" smtClean="0"/>
-              <a:t>19/01/2018</a:t>
+              <a:t>22/01/2018</a:t>
             </a:fld>
-            <a:endParaRPr lang="fr-FR"/>
+            <a:endParaRPr lang="fr-FR" dirty="0"/>
           </a:p>
         </p:txBody>
       </p:sp>
@@ -3809,7 +3812,7 @@
           <a:bodyPr/>
           <a:lstStyle/>
           <a:p>
-            <a:endParaRPr lang="fr-FR"/>
+            <a:endParaRPr lang="fr-FR" dirty="0"/>
           </a:p>
         </p:txBody>
       </p:sp>
@@ -3832,7 +3835,7 @@
               <a:rPr lang="fr-FR" smtClean="0"/>
               <a:t>‹N°›</a:t>
             </a:fld>
-            <a:endParaRPr lang="fr-FR"/>
+            <a:endParaRPr lang="fr-FR" dirty="0"/>
           </a:p>
         </p:txBody>
       </p:sp>
@@ -3911,9 +3914,9 @@
           <a:p>
             <a:fld id="{065F3140-87E1-4878-A2FB-1306ED21F06D}" type="datetimeFigureOut">
               <a:rPr lang="fr-FR" smtClean="0"/>
-              <a:t>19/01/2018</a:t>
+              <a:t>22/01/2018</a:t>
             </a:fld>
-            <a:endParaRPr lang="fr-FR"/>
+            <a:endParaRPr lang="fr-FR" dirty="0"/>
           </a:p>
         </p:txBody>
       </p:sp>
@@ -3932,7 +3935,7 @@
           <a:bodyPr/>
           <a:lstStyle/>
           <a:p>
-            <a:endParaRPr lang="fr-FR"/>
+            <a:endParaRPr lang="fr-FR" dirty="0"/>
           </a:p>
         </p:txBody>
       </p:sp>
@@ -3955,7 +3958,7 @@
               <a:rPr lang="fr-FR" smtClean="0"/>
               <a:t>‹N°›</a:t>
             </a:fld>
-            <a:endParaRPr lang="fr-FR"/>
+            <a:endParaRPr lang="fr-FR" dirty="0"/>
           </a:p>
         </p:txBody>
       </p:sp>
@@ -4006,9 +4009,9 @@
           <a:p>
             <a:fld id="{065F3140-87E1-4878-A2FB-1306ED21F06D}" type="datetimeFigureOut">
               <a:rPr lang="fr-FR" smtClean="0"/>
-              <a:t>19/01/2018</a:t>
+              <a:t>22/01/2018</a:t>
             </a:fld>
-            <a:endParaRPr lang="fr-FR"/>
+            <a:endParaRPr lang="fr-FR" dirty="0"/>
           </a:p>
         </p:txBody>
       </p:sp>
@@ -4027,7 +4030,7 @@
           <a:bodyPr/>
           <a:lstStyle/>
           <a:p>
-            <a:endParaRPr lang="fr-FR"/>
+            <a:endParaRPr lang="fr-FR" dirty="0"/>
           </a:p>
         </p:txBody>
       </p:sp>
@@ -4050,7 +4053,7 @@
               <a:rPr lang="fr-FR" smtClean="0"/>
               <a:t>‹N°›</a:t>
             </a:fld>
-            <a:endParaRPr lang="fr-FR"/>
+            <a:endParaRPr lang="fr-FR" dirty="0"/>
           </a:p>
         </p:txBody>
       </p:sp>
@@ -4769,9 +4772,9 @@
           <a:p>
             <a:fld id="{065F3140-87E1-4878-A2FB-1306ED21F06D}" type="datetimeFigureOut">
               <a:rPr lang="fr-FR" smtClean="0"/>
-              <a:t>19/01/2018</a:t>
+              <a:t>22/01/2018</a:t>
             </a:fld>
-            <a:endParaRPr lang="fr-FR"/>
+            <a:endParaRPr lang="fr-FR" dirty="0"/>
           </a:p>
         </p:txBody>
       </p:sp>
@@ -4795,7 +4798,7 @@
           <a:bodyPr/>
           <a:lstStyle/>
           <a:p>
-            <a:endParaRPr lang="fr-FR"/>
+            <a:endParaRPr lang="fr-FR" dirty="0"/>
           </a:p>
         </p:txBody>
       </p:sp>
@@ -4823,7 +4826,7 @@
               <a:rPr lang="fr-FR" smtClean="0"/>
               <a:t>‹N°›</a:t>
             </a:fld>
-            <a:endParaRPr lang="fr-FR"/>
+            <a:endParaRPr lang="fr-FR" dirty="0"/>
           </a:p>
         </p:txBody>
       </p:sp>
@@ -4964,7 +4967,7 @@
           </a:lstStyle>
           <a:p>
             <a:r>
-              <a:rPr lang="fr-FR"/>
+              <a:rPr lang="fr-FR" dirty="0"/>
               <a:t>Cliquez sur l'icône pour ajouter une image</a:t>
             </a:r>
             <a:endParaRPr lang="en-US" dirty="0"/>
@@ -5609,9 +5612,9 @@
           <a:p>
             <a:fld id="{065F3140-87E1-4878-A2FB-1306ED21F06D}" type="datetimeFigureOut">
               <a:rPr lang="fr-FR" smtClean="0"/>
-              <a:t>19/01/2018</a:t>
+              <a:t>22/01/2018</a:t>
             </a:fld>
-            <a:endParaRPr lang="fr-FR"/>
+            <a:endParaRPr lang="fr-FR" dirty="0"/>
           </a:p>
         </p:txBody>
       </p:sp>
@@ -5635,7 +5638,7 @@
           <a:bodyPr/>
           <a:lstStyle/>
           <a:p>
-            <a:endParaRPr lang="fr-FR"/>
+            <a:endParaRPr lang="fr-FR" dirty="0"/>
           </a:p>
         </p:txBody>
       </p:sp>
@@ -5663,7 +5666,7 @@
               <a:rPr lang="fr-FR" smtClean="0"/>
               <a:t>‹N°›</a:t>
             </a:fld>
-            <a:endParaRPr lang="fr-FR"/>
+            <a:endParaRPr lang="fr-FR" dirty="0"/>
           </a:p>
         </p:txBody>
       </p:sp>
@@ -5836,9 +5839,9 @@
           <a:p>
             <a:fld id="{065F3140-87E1-4878-A2FB-1306ED21F06D}" type="datetimeFigureOut">
               <a:rPr lang="fr-FR" smtClean="0"/>
-              <a:t>19/01/2018</a:t>
+              <a:t>22/01/2018</a:t>
             </a:fld>
-            <a:endParaRPr lang="fr-FR"/>
+            <a:endParaRPr lang="fr-FR" dirty="0"/>
           </a:p>
         </p:txBody>
       </p:sp>
@@ -5876,7 +5879,7 @@
             </a:lvl1pPr>
           </a:lstStyle>
           <a:p>
-            <a:endParaRPr lang="fr-FR"/>
+            <a:endParaRPr lang="fr-FR" dirty="0"/>
           </a:p>
         </p:txBody>
       </p:sp>
@@ -5918,7 +5921,7 @@
               <a:rPr lang="fr-FR" smtClean="0"/>
               <a:t>‹N°›</a:t>
             </a:fld>
-            <a:endParaRPr lang="fr-FR"/>
+            <a:endParaRPr lang="fr-FR" dirty="0"/>
           </a:p>
         </p:txBody>
       </p:sp>
@@ -6936,6 +6939,1500 @@
           <p:cNvPr id="2" name="Titre 1">
             <a:extLst>
               <a:ext uri="{FF2B5EF4-FFF2-40B4-BE49-F238E27FC236}">
+                <a16:creationId xmlns:a16="http://schemas.microsoft.com/office/drawing/2014/main" id="{ECF3205A-52EA-4FB9-B6D3-BE6C041C547E}"/>
+              </a:ext>
+            </a:extLst>
+          </p:cNvPr>
+          <p:cNvSpPr>
+            <a:spLocks noGrp="1"/>
+          </p:cNvSpPr>
+          <p:nvPr>
+            <p:ph type="title"/>
+          </p:nvPr>
+        </p:nvSpPr>
+        <p:spPr>
+          <a:xfrm>
+            <a:off x="1251678" y="382385"/>
+            <a:ext cx="10178322" cy="1492132"/>
+          </a:xfrm>
+        </p:spPr>
+        <p:txBody>
+          <a:bodyPr/>
+          <a:lstStyle/>
+          <a:p>
+            <a:r>
+              <a:rPr lang="fr-FR" dirty="0"/>
+              <a:t>Branchement et code Arduino</a:t>
+            </a:r>
+          </a:p>
+        </p:txBody>
+      </p:sp>
+      <p:pic>
+        <p:nvPicPr>
+          <p:cNvPr id="5" name="Espace réservé du contenu 4">
+            <a:extLst>
+              <a:ext uri="{FF2B5EF4-FFF2-40B4-BE49-F238E27FC236}">
+                <a16:creationId xmlns:a16="http://schemas.microsoft.com/office/drawing/2014/main" id="{15BC3C2B-3775-4611-97D2-254FA42E01F7}"/>
+              </a:ext>
+            </a:extLst>
+          </p:cNvPr>
+          <p:cNvPicPr>
+            <a:picLocks noGrp="1" noChangeAspect="1"/>
+          </p:cNvPicPr>
+          <p:nvPr>
+            <p:ph sz="half" idx="1"/>
+          </p:nvPr>
+        </p:nvPicPr>
+        <p:blipFill>
+          <a:blip r:embed="rId2"/>
+          <a:stretch>
+            <a:fillRect/>
+          </a:stretch>
+        </p:blipFill>
+        <p:spPr>
+          <a:xfrm>
+            <a:off x="893229" y="2500313"/>
+            <a:ext cx="5164671" cy="2980753"/>
+          </a:xfrm>
+          <a:prstGeom prst="rect">
+            <a:avLst/>
+          </a:prstGeom>
+        </p:spPr>
+      </p:pic>
+      <p:sp>
+        <p:nvSpPr>
+          <p:cNvPr id="4" name="Espace réservé du contenu 3">
+            <a:extLst>
+              <a:ext uri="{FF2B5EF4-FFF2-40B4-BE49-F238E27FC236}">
+                <a16:creationId xmlns:a16="http://schemas.microsoft.com/office/drawing/2014/main" id="{1E1165C3-D182-40D9-9AEE-4D387EC57A12}"/>
+              </a:ext>
+            </a:extLst>
+          </p:cNvPr>
+          <p:cNvSpPr>
+            <a:spLocks noGrp="1"/>
+          </p:cNvSpPr>
+          <p:nvPr>
+            <p:ph sz="half" idx="2"/>
+          </p:nvPr>
+        </p:nvSpPr>
+        <p:spPr>
+          <a:xfrm>
+            <a:off x="6334059" y="1354578"/>
+            <a:ext cx="5164671" cy="5503422"/>
+          </a:xfrm>
+        </p:spPr>
+        <p:txBody>
+          <a:bodyPr>
+            <a:noAutofit/>
+          </a:bodyPr>
+          <a:lstStyle/>
+          <a:p>
+            <a:pPr marL="0" indent="0">
+              <a:buNone/>
+            </a:pPr>
+            <a:r>
+              <a:rPr lang="fr-FR" sz="1200" dirty="0"/>
+              <a:t>Exemple : </a:t>
+            </a:r>
+          </a:p>
+          <a:p>
+            <a:pPr marL="0" indent="0">
+              <a:buNone/>
+            </a:pPr>
+            <a:r>
+              <a:rPr lang="fr-FR" sz="1200" dirty="0"/>
+              <a:t>int buttonPin = 2;    </a:t>
+            </a:r>
+          </a:p>
+          <a:p>
+            <a:pPr marL="0" indent="0">
+              <a:buNone/>
+            </a:pPr>
+            <a:r>
+              <a:rPr lang="fr-FR" sz="1200" dirty="0"/>
+              <a:t>int ledPin =  13;      </a:t>
+            </a:r>
+          </a:p>
+          <a:p>
+            <a:pPr marL="0" indent="0">
+              <a:buNone/>
+            </a:pPr>
+            <a:endParaRPr lang="fr-FR" sz="1200" dirty="0"/>
+          </a:p>
+          <a:p>
+            <a:pPr marL="0" indent="0">
+              <a:buNone/>
+            </a:pPr>
+            <a:r>
+              <a:rPr lang="fr-FR" sz="1200" dirty="0"/>
+              <a:t>int buttonState = 0;</a:t>
+            </a:r>
+          </a:p>
+          <a:p>
+            <a:pPr marL="0" indent="0">
+              <a:buNone/>
+            </a:pPr>
+            <a:endParaRPr lang="fr-FR" sz="1200" dirty="0"/>
+          </a:p>
+          <a:p>
+            <a:pPr marL="0" indent="0">
+              <a:buNone/>
+            </a:pPr>
+            <a:r>
+              <a:rPr lang="fr-FR" sz="1200" dirty="0"/>
+              <a:t>void setup() {</a:t>
+            </a:r>
+          </a:p>
+          <a:p>
+            <a:pPr marL="0" indent="0">
+              <a:buNone/>
+            </a:pPr>
+            <a:r>
+              <a:rPr lang="fr-FR" sz="1200" dirty="0"/>
+              <a:t>          pinMode(ledPin, OUTPUT);</a:t>
+            </a:r>
+          </a:p>
+          <a:p>
+            <a:pPr marL="0" indent="0">
+              <a:buNone/>
+            </a:pPr>
+            <a:r>
+              <a:rPr lang="fr-FR" sz="1200" dirty="0"/>
+              <a:t>          pinMode(buttonPin, INPUT);</a:t>
+            </a:r>
+          </a:p>
+          <a:p>
+            <a:pPr marL="0" indent="0">
+              <a:buNone/>
+            </a:pPr>
+            <a:r>
+              <a:rPr lang="fr-FR" sz="1200" dirty="0"/>
+              <a:t>}</a:t>
+            </a:r>
+          </a:p>
+          <a:p>
+            <a:pPr marL="0" indent="0">
+              <a:buNone/>
+            </a:pPr>
+            <a:endParaRPr lang="fr-FR" sz="1200" dirty="0"/>
+          </a:p>
+          <a:p>
+            <a:pPr marL="0" indent="0">
+              <a:buNone/>
+            </a:pPr>
+            <a:r>
+              <a:rPr lang="fr-FR" sz="1200" dirty="0"/>
+              <a:t>void loop() {</a:t>
+            </a:r>
+          </a:p>
+          <a:p>
+            <a:pPr marL="0" indent="0">
+              <a:buNone/>
+            </a:pPr>
+            <a:r>
+              <a:rPr lang="fr-FR" sz="1200" dirty="0"/>
+              <a:t>          buttonState = digitalRead(buttonPin);</a:t>
+            </a:r>
+          </a:p>
+          <a:p>
+            <a:pPr marL="0" indent="0">
+              <a:buNone/>
+            </a:pPr>
+            <a:r>
+              <a:rPr lang="fr-FR" sz="1200" dirty="0"/>
+              <a:t>          if (buttonState == HIGH) {</a:t>
+            </a:r>
+          </a:p>
+          <a:p>
+            <a:pPr marL="0" indent="0">
+              <a:buNone/>
+            </a:pPr>
+            <a:r>
+              <a:rPr lang="fr-FR" sz="1200" dirty="0"/>
+              <a:t>                digitalWrite(ledPin, HIGH);</a:t>
+            </a:r>
+          </a:p>
+          <a:p>
+            <a:pPr marL="0" indent="0">
+              <a:buNone/>
+            </a:pPr>
+            <a:r>
+              <a:rPr lang="fr-FR" sz="1200" dirty="0"/>
+              <a:t>           } else {</a:t>
+            </a:r>
+          </a:p>
+          <a:p>
+            <a:pPr marL="0" indent="0">
+              <a:buNone/>
+            </a:pPr>
+            <a:r>
+              <a:rPr lang="fr-FR" sz="1200" dirty="0"/>
+              <a:t>                 digitalWrite(ledPin, LOW);</a:t>
+            </a:r>
+          </a:p>
+          <a:p>
+            <a:pPr marL="0" indent="0">
+              <a:buNone/>
+            </a:pPr>
+            <a:r>
+              <a:rPr lang="fr-FR" sz="1200" dirty="0"/>
+              <a:t>            }</a:t>
+            </a:r>
+          </a:p>
+          <a:p>
+            <a:pPr marL="0" indent="0">
+              <a:buNone/>
+            </a:pPr>
+            <a:r>
+              <a:rPr lang="fr-FR" sz="1200" dirty="0"/>
+              <a:t>}</a:t>
+            </a:r>
+          </a:p>
+        </p:txBody>
+      </p:sp>
+    </p:spTree>
+    <p:extLst>
+      <p:ext uri="{BB962C8B-B14F-4D97-AF65-F5344CB8AC3E}">
+        <p14:creationId xmlns:p14="http://schemas.microsoft.com/office/powerpoint/2010/main" val="3687619800"/>
+      </p:ext>
+    </p:extLst>
+  </p:cSld>
+  <p:clrMapOvr>
+    <a:masterClrMapping/>
+  </p:clrMapOvr>
+</p:sld>
+</file>
+
+<file path=ppt/slides/slide11.xml><?xml version="1.0" encoding="utf-8"?>
+<p:sld xmlns:a="http://schemas.openxmlformats.org/drawingml/2006/main" xmlns:r="http://schemas.openxmlformats.org/officeDocument/2006/relationships" xmlns:p="http://schemas.openxmlformats.org/presentationml/2006/main">
+  <p:cSld>
+    <p:bg>
+      <p:bgPr>
+        <a:solidFill>
+          <a:schemeClr val="bg2"/>
+        </a:solidFill>
+        <a:effectLst/>
+      </p:bgPr>
+    </p:bg>
+    <p:spTree>
+      <p:nvGrpSpPr>
+        <p:cNvPr id="1" name=""/>
+        <p:cNvGrpSpPr/>
+        <p:nvPr/>
+      </p:nvGrpSpPr>
+      <p:grpSpPr>
+        <a:xfrm>
+          <a:off x="0" y="0"/>
+          <a:ext cx="0" cy="0"/>
+          <a:chOff x="0" y="0"/>
+          <a:chExt cx="0" cy="0"/>
+        </a:xfrm>
+      </p:grpSpPr>
+      <p:sp>
+        <p:nvSpPr>
+          <p:cNvPr id="21" name="Freeform 6" title="Left scallop edge">
+            <a:extLst>
+              <a:ext uri="{FF2B5EF4-FFF2-40B4-BE49-F238E27FC236}">
+                <a16:creationId xmlns:a16="http://schemas.microsoft.com/office/drawing/2014/main" id="{3408ACDA-FBD2-4415-9EE4-4D1BBDF174D9}"/>
+              </a:ext>
+            </a:extLst>
+          </p:cNvPr>
+          <p:cNvSpPr>
+            <a:spLocks noGrp="1" noRot="1" noChangeAspect="1" noMove="1" noResize="1" noEditPoints="1" noAdjustHandles="1" noChangeArrowheads="1" noChangeShapeType="1" noTextEdit="1"/>
+          </p:cNvSpPr>
+          <p:nvPr>
+            <p:extLst>
+              <p:ext uri="{386F3935-93C4-4BCD-93E2-E3B085C9AB24}">
+                <p16:designElem xmlns:p16="http://schemas.microsoft.com/office/powerpoint/2015/main" val="1"/>
+              </p:ext>
+            </p:extLst>
+          </p:nvPr>
+        </p:nvSpPr>
+        <p:spPr bwMode="auto">
+          <a:xfrm>
+            <a:off x="0" y="0"/>
+            <a:ext cx="885825" cy="6858000"/>
+          </a:xfrm>
+          <a:custGeom>
+            <a:avLst/>
+            <a:gdLst/>
+            <a:ahLst/>
+            <a:cxnLst/>
+            <a:rect l="0" t="0" r="r" b="b"/>
+            <a:pathLst>
+              <a:path w="558" h="4320">
+                <a:moveTo>
+                  <a:pt x="0" y="0"/>
+                </a:moveTo>
+                <a:lnTo>
+                  <a:pt x="447" y="0"/>
+                </a:lnTo>
+                <a:lnTo>
+                  <a:pt x="448" y="43"/>
+                </a:lnTo>
+                <a:lnTo>
+                  <a:pt x="453" y="81"/>
+                </a:lnTo>
+                <a:lnTo>
+                  <a:pt x="460" y="114"/>
+                </a:lnTo>
+                <a:lnTo>
+                  <a:pt x="469" y="143"/>
+                </a:lnTo>
+                <a:lnTo>
+                  <a:pt x="479" y="169"/>
+                </a:lnTo>
+                <a:lnTo>
+                  <a:pt x="491" y="192"/>
+                </a:lnTo>
+                <a:lnTo>
+                  <a:pt x="503" y="216"/>
+                </a:lnTo>
+                <a:lnTo>
+                  <a:pt x="515" y="240"/>
+                </a:lnTo>
+                <a:lnTo>
+                  <a:pt x="525" y="263"/>
+                </a:lnTo>
+                <a:lnTo>
+                  <a:pt x="535" y="289"/>
+                </a:lnTo>
+                <a:lnTo>
+                  <a:pt x="545" y="318"/>
+                </a:lnTo>
+                <a:lnTo>
+                  <a:pt x="552" y="351"/>
+                </a:lnTo>
+                <a:lnTo>
+                  <a:pt x="556" y="389"/>
+                </a:lnTo>
+                <a:lnTo>
+                  <a:pt x="558" y="432"/>
+                </a:lnTo>
+                <a:lnTo>
+                  <a:pt x="556" y="475"/>
+                </a:lnTo>
+                <a:lnTo>
+                  <a:pt x="552" y="513"/>
+                </a:lnTo>
+                <a:lnTo>
+                  <a:pt x="545" y="546"/>
+                </a:lnTo>
+                <a:lnTo>
+                  <a:pt x="535" y="575"/>
+                </a:lnTo>
+                <a:lnTo>
+                  <a:pt x="525" y="601"/>
+                </a:lnTo>
+                <a:lnTo>
+                  <a:pt x="515" y="624"/>
+                </a:lnTo>
+                <a:lnTo>
+                  <a:pt x="503" y="648"/>
+                </a:lnTo>
+                <a:lnTo>
+                  <a:pt x="491" y="672"/>
+                </a:lnTo>
+                <a:lnTo>
+                  <a:pt x="479" y="695"/>
+                </a:lnTo>
+                <a:lnTo>
+                  <a:pt x="469" y="721"/>
+                </a:lnTo>
+                <a:lnTo>
+                  <a:pt x="460" y="750"/>
+                </a:lnTo>
+                <a:lnTo>
+                  <a:pt x="453" y="783"/>
+                </a:lnTo>
+                <a:lnTo>
+                  <a:pt x="448" y="821"/>
+                </a:lnTo>
+                <a:lnTo>
+                  <a:pt x="447" y="864"/>
+                </a:lnTo>
+                <a:lnTo>
+                  <a:pt x="448" y="907"/>
+                </a:lnTo>
+                <a:lnTo>
+                  <a:pt x="453" y="945"/>
+                </a:lnTo>
+                <a:lnTo>
+                  <a:pt x="460" y="978"/>
+                </a:lnTo>
+                <a:lnTo>
+                  <a:pt x="469" y="1007"/>
+                </a:lnTo>
+                <a:lnTo>
+                  <a:pt x="479" y="1033"/>
+                </a:lnTo>
+                <a:lnTo>
+                  <a:pt x="491" y="1056"/>
+                </a:lnTo>
+                <a:lnTo>
+                  <a:pt x="503" y="1080"/>
+                </a:lnTo>
+                <a:lnTo>
+                  <a:pt x="515" y="1104"/>
+                </a:lnTo>
+                <a:lnTo>
+                  <a:pt x="525" y="1127"/>
+                </a:lnTo>
+                <a:lnTo>
+                  <a:pt x="535" y="1153"/>
+                </a:lnTo>
+                <a:lnTo>
+                  <a:pt x="545" y="1182"/>
+                </a:lnTo>
+                <a:lnTo>
+                  <a:pt x="552" y="1215"/>
+                </a:lnTo>
+                <a:lnTo>
+                  <a:pt x="556" y="1253"/>
+                </a:lnTo>
+                <a:lnTo>
+                  <a:pt x="558" y="1296"/>
+                </a:lnTo>
+                <a:lnTo>
+                  <a:pt x="556" y="1339"/>
+                </a:lnTo>
+                <a:lnTo>
+                  <a:pt x="552" y="1377"/>
+                </a:lnTo>
+                <a:lnTo>
+                  <a:pt x="545" y="1410"/>
+                </a:lnTo>
+                <a:lnTo>
+                  <a:pt x="535" y="1439"/>
+                </a:lnTo>
+                <a:lnTo>
+                  <a:pt x="525" y="1465"/>
+                </a:lnTo>
+                <a:lnTo>
+                  <a:pt x="515" y="1488"/>
+                </a:lnTo>
+                <a:lnTo>
+                  <a:pt x="503" y="1512"/>
+                </a:lnTo>
+                <a:lnTo>
+                  <a:pt x="491" y="1536"/>
+                </a:lnTo>
+                <a:lnTo>
+                  <a:pt x="479" y="1559"/>
+                </a:lnTo>
+                <a:lnTo>
+                  <a:pt x="469" y="1585"/>
+                </a:lnTo>
+                <a:lnTo>
+                  <a:pt x="460" y="1614"/>
+                </a:lnTo>
+                <a:lnTo>
+                  <a:pt x="453" y="1647"/>
+                </a:lnTo>
+                <a:lnTo>
+                  <a:pt x="448" y="1685"/>
+                </a:lnTo>
+                <a:lnTo>
+                  <a:pt x="447" y="1728"/>
+                </a:lnTo>
+                <a:lnTo>
+                  <a:pt x="448" y="1771"/>
+                </a:lnTo>
+                <a:lnTo>
+                  <a:pt x="453" y="1809"/>
+                </a:lnTo>
+                <a:lnTo>
+                  <a:pt x="460" y="1842"/>
+                </a:lnTo>
+                <a:lnTo>
+                  <a:pt x="469" y="1871"/>
+                </a:lnTo>
+                <a:lnTo>
+                  <a:pt x="479" y="1897"/>
+                </a:lnTo>
+                <a:lnTo>
+                  <a:pt x="491" y="1920"/>
+                </a:lnTo>
+                <a:lnTo>
+                  <a:pt x="503" y="1944"/>
+                </a:lnTo>
+                <a:lnTo>
+                  <a:pt x="515" y="1968"/>
+                </a:lnTo>
+                <a:lnTo>
+                  <a:pt x="525" y="1991"/>
+                </a:lnTo>
+                <a:lnTo>
+                  <a:pt x="535" y="2017"/>
+                </a:lnTo>
+                <a:lnTo>
+                  <a:pt x="545" y="2046"/>
+                </a:lnTo>
+                <a:lnTo>
+                  <a:pt x="552" y="2079"/>
+                </a:lnTo>
+                <a:lnTo>
+                  <a:pt x="556" y="2117"/>
+                </a:lnTo>
+                <a:lnTo>
+                  <a:pt x="558" y="2159"/>
+                </a:lnTo>
+                <a:lnTo>
+                  <a:pt x="556" y="2203"/>
+                </a:lnTo>
+                <a:lnTo>
+                  <a:pt x="552" y="2241"/>
+                </a:lnTo>
+                <a:lnTo>
+                  <a:pt x="545" y="2274"/>
+                </a:lnTo>
+                <a:lnTo>
+                  <a:pt x="535" y="2303"/>
+                </a:lnTo>
+                <a:lnTo>
+                  <a:pt x="525" y="2329"/>
+                </a:lnTo>
+                <a:lnTo>
+                  <a:pt x="515" y="2352"/>
+                </a:lnTo>
+                <a:lnTo>
+                  <a:pt x="503" y="2376"/>
+                </a:lnTo>
+                <a:lnTo>
+                  <a:pt x="491" y="2400"/>
+                </a:lnTo>
+                <a:lnTo>
+                  <a:pt x="479" y="2423"/>
+                </a:lnTo>
+                <a:lnTo>
+                  <a:pt x="469" y="2449"/>
+                </a:lnTo>
+                <a:lnTo>
+                  <a:pt x="460" y="2478"/>
+                </a:lnTo>
+                <a:lnTo>
+                  <a:pt x="453" y="2511"/>
+                </a:lnTo>
+                <a:lnTo>
+                  <a:pt x="448" y="2549"/>
+                </a:lnTo>
+                <a:lnTo>
+                  <a:pt x="447" y="2592"/>
+                </a:lnTo>
+                <a:lnTo>
+                  <a:pt x="448" y="2635"/>
+                </a:lnTo>
+                <a:lnTo>
+                  <a:pt x="453" y="2673"/>
+                </a:lnTo>
+                <a:lnTo>
+                  <a:pt x="460" y="2706"/>
+                </a:lnTo>
+                <a:lnTo>
+                  <a:pt x="469" y="2735"/>
+                </a:lnTo>
+                <a:lnTo>
+                  <a:pt x="479" y="2761"/>
+                </a:lnTo>
+                <a:lnTo>
+                  <a:pt x="491" y="2784"/>
+                </a:lnTo>
+                <a:lnTo>
+                  <a:pt x="515" y="2832"/>
+                </a:lnTo>
+                <a:lnTo>
+                  <a:pt x="525" y="2855"/>
+                </a:lnTo>
+                <a:lnTo>
+                  <a:pt x="535" y="2881"/>
+                </a:lnTo>
+                <a:lnTo>
+                  <a:pt x="545" y="2910"/>
+                </a:lnTo>
+                <a:lnTo>
+                  <a:pt x="552" y="2943"/>
+                </a:lnTo>
+                <a:lnTo>
+                  <a:pt x="556" y="2981"/>
+                </a:lnTo>
+                <a:lnTo>
+                  <a:pt x="558" y="3024"/>
+                </a:lnTo>
+                <a:lnTo>
+                  <a:pt x="556" y="3067"/>
+                </a:lnTo>
+                <a:lnTo>
+                  <a:pt x="552" y="3105"/>
+                </a:lnTo>
+                <a:lnTo>
+                  <a:pt x="545" y="3138"/>
+                </a:lnTo>
+                <a:lnTo>
+                  <a:pt x="535" y="3167"/>
+                </a:lnTo>
+                <a:lnTo>
+                  <a:pt x="525" y="3193"/>
+                </a:lnTo>
+                <a:lnTo>
+                  <a:pt x="515" y="3216"/>
+                </a:lnTo>
+                <a:lnTo>
+                  <a:pt x="503" y="3240"/>
+                </a:lnTo>
+                <a:lnTo>
+                  <a:pt x="491" y="3264"/>
+                </a:lnTo>
+                <a:lnTo>
+                  <a:pt x="479" y="3287"/>
+                </a:lnTo>
+                <a:lnTo>
+                  <a:pt x="469" y="3313"/>
+                </a:lnTo>
+                <a:lnTo>
+                  <a:pt x="460" y="3342"/>
+                </a:lnTo>
+                <a:lnTo>
+                  <a:pt x="453" y="3375"/>
+                </a:lnTo>
+                <a:lnTo>
+                  <a:pt x="448" y="3413"/>
+                </a:lnTo>
+                <a:lnTo>
+                  <a:pt x="447" y="3456"/>
+                </a:lnTo>
+                <a:lnTo>
+                  <a:pt x="448" y="3499"/>
+                </a:lnTo>
+                <a:lnTo>
+                  <a:pt x="453" y="3537"/>
+                </a:lnTo>
+                <a:lnTo>
+                  <a:pt x="460" y="3570"/>
+                </a:lnTo>
+                <a:lnTo>
+                  <a:pt x="469" y="3599"/>
+                </a:lnTo>
+                <a:lnTo>
+                  <a:pt x="479" y="3625"/>
+                </a:lnTo>
+                <a:lnTo>
+                  <a:pt x="491" y="3648"/>
+                </a:lnTo>
+                <a:lnTo>
+                  <a:pt x="503" y="3672"/>
+                </a:lnTo>
+                <a:lnTo>
+                  <a:pt x="515" y="3696"/>
+                </a:lnTo>
+                <a:lnTo>
+                  <a:pt x="525" y="3719"/>
+                </a:lnTo>
+                <a:lnTo>
+                  <a:pt x="535" y="3745"/>
+                </a:lnTo>
+                <a:lnTo>
+                  <a:pt x="545" y="3774"/>
+                </a:lnTo>
+                <a:lnTo>
+                  <a:pt x="552" y="3807"/>
+                </a:lnTo>
+                <a:lnTo>
+                  <a:pt x="556" y="3845"/>
+                </a:lnTo>
+                <a:lnTo>
+                  <a:pt x="558" y="3888"/>
+                </a:lnTo>
+                <a:lnTo>
+                  <a:pt x="556" y="3931"/>
+                </a:lnTo>
+                <a:lnTo>
+                  <a:pt x="552" y="3969"/>
+                </a:lnTo>
+                <a:lnTo>
+                  <a:pt x="545" y="4002"/>
+                </a:lnTo>
+                <a:lnTo>
+                  <a:pt x="535" y="4031"/>
+                </a:lnTo>
+                <a:lnTo>
+                  <a:pt x="525" y="4057"/>
+                </a:lnTo>
+                <a:lnTo>
+                  <a:pt x="515" y="4080"/>
+                </a:lnTo>
+                <a:lnTo>
+                  <a:pt x="503" y="4104"/>
+                </a:lnTo>
+                <a:lnTo>
+                  <a:pt x="491" y="4128"/>
+                </a:lnTo>
+                <a:lnTo>
+                  <a:pt x="479" y="4151"/>
+                </a:lnTo>
+                <a:lnTo>
+                  <a:pt x="469" y="4177"/>
+                </a:lnTo>
+                <a:lnTo>
+                  <a:pt x="460" y="4206"/>
+                </a:lnTo>
+                <a:lnTo>
+                  <a:pt x="453" y="4239"/>
+                </a:lnTo>
+                <a:lnTo>
+                  <a:pt x="448" y="4277"/>
+                </a:lnTo>
+                <a:lnTo>
+                  <a:pt x="447" y="4320"/>
+                </a:lnTo>
+                <a:lnTo>
+                  <a:pt x="0" y="4320"/>
+                </a:lnTo>
+                <a:lnTo>
+                  <a:pt x="0" y="0"/>
+                </a:lnTo>
+                <a:close/>
+              </a:path>
+            </a:pathLst>
+          </a:custGeom>
+          <a:solidFill>
+            <a:schemeClr val="tx2"/>
+          </a:solidFill>
+          <a:ln w="0">
+            <a:noFill/>
+            <a:prstDash val="solid"/>
+            <a:round/>
+            <a:headEnd/>
+            <a:tailEnd/>
+          </a:ln>
+        </p:spPr>
+      </p:sp>
+      <p:sp>
+        <p:nvSpPr>
+          <p:cNvPr id="22" name="Rectangle 12" title="right edge border">
+            <a:extLst>
+              <a:ext uri="{FF2B5EF4-FFF2-40B4-BE49-F238E27FC236}">
+                <a16:creationId xmlns:a16="http://schemas.microsoft.com/office/drawing/2014/main" id="{5030595D-127E-4DC3-8E40-9374B113DF87}"/>
+              </a:ext>
+            </a:extLst>
+          </p:cNvPr>
+          <p:cNvSpPr>
+            <a:spLocks noGrp="1" noRot="1" noChangeAspect="1" noMove="1" noResize="1" noEditPoints="1" noAdjustHandles="1" noChangeArrowheads="1" noChangeShapeType="1" noTextEdit="1"/>
+          </p:cNvSpPr>
+          <p:nvPr>
+            <p:extLst>
+              <p:ext uri="{386F3935-93C4-4BCD-93E2-E3B085C9AB24}">
+                <p16:designElem xmlns:p16="http://schemas.microsoft.com/office/powerpoint/2015/main" val="1"/>
+              </p:ext>
+            </p:extLst>
+          </p:nvPr>
+        </p:nvSpPr>
+        <p:spPr>
+          <a:xfrm>
+            <a:off x="11908536" y="0"/>
+            <a:ext cx="283464" cy="6858000"/>
+          </a:xfrm>
+          <a:prstGeom prst="rect">
+            <a:avLst/>
+          </a:prstGeom>
+          <a:solidFill>
+            <a:schemeClr val="accent1"/>
+          </a:solidFill>
+          <a:ln>
+            <a:noFill/>
+          </a:ln>
+        </p:spPr>
+        <p:style>
+          <a:lnRef idx="2">
+            <a:schemeClr val="accent1">
+              <a:shade val="50000"/>
+            </a:schemeClr>
+          </a:lnRef>
+          <a:fillRef idx="1">
+            <a:schemeClr val="accent1"/>
+          </a:fillRef>
+          <a:effectRef idx="0">
+            <a:schemeClr val="accent1"/>
+          </a:effectRef>
+          <a:fontRef idx="minor">
+            <a:schemeClr val="lt1"/>
+          </a:fontRef>
+        </p:style>
+      </p:sp>
+      <p:sp>
+        <p:nvSpPr>
+          <p:cNvPr id="2" name="Titre 1">
+            <a:extLst>
+              <a:ext uri="{FF2B5EF4-FFF2-40B4-BE49-F238E27FC236}">
+                <a16:creationId xmlns:a16="http://schemas.microsoft.com/office/drawing/2014/main" id="{92EAEAC2-DCAB-49BC-AB9E-12566F3ADD46}"/>
+              </a:ext>
+            </a:extLst>
+          </p:cNvPr>
+          <p:cNvSpPr>
+            <a:spLocks noGrp="1"/>
+          </p:cNvSpPr>
+          <p:nvPr>
+            <p:ph type="title"/>
+          </p:nvPr>
+        </p:nvSpPr>
+        <p:spPr>
+          <a:xfrm>
+            <a:off x="993913" y="645107"/>
+            <a:ext cx="3511545" cy="1640894"/>
+          </a:xfrm>
+        </p:spPr>
+        <p:txBody>
+          <a:bodyPr vert="horz" lIns="91440" tIns="45720" rIns="91440" bIns="45720" rtlCol="0" anchor="t">
+            <a:normAutofit/>
+          </a:bodyPr>
+          <a:lstStyle/>
+          <a:p>
+            <a:r>
+              <a:rPr lang="en-US" sz="3100" dirty="0"/>
+              <a:t>Communication entre Android et Arduino</a:t>
+            </a:r>
+          </a:p>
+        </p:txBody>
+      </p:sp>
+      <p:sp>
+        <p:nvSpPr>
+          <p:cNvPr id="3" name="Espace réservé du contenu 2">
+            <a:extLst>
+              <a:ext uri="{FF2B5EF4-FFF2-40B4-BE49-F238E27FC236}">
+                <a16:creationId xmlns:a16="http://schemas.microsoft.com/office/drawing/2014/main" id="{D9762258-4819-4487-9B8C-805347755054}"/>
+              </a:ext>
+            </a:extLst>
+          </p:cNvPr>
+          <p:cNvSpPr>
+            <a:spLocks noGrp="1"/>
+          </p:cNvSpPr>
+          <p:nvPr>
+            <p:ph sz="half" idx="1"/>
+          </p:nvPr>
+        </p:nvSpPr>
+        <p:spPr>
+          <a:xfrm>
+            <a:off x="993913" y="2286001"/>
+            <a:ext cx="3511545" cy="3940844"/>
+          </a:xfrm>
+        </p:spPr>
+        <p:txBody>
+          <a:bodyPr vert="horz" lIns="91440" tIns="45720" rIns="91440" bIns="45720" rtlCol="0">
+            <a:normAutofit lnSpcReduction="10000"/>
+          </a:bodyPr>
+          <a:lstStyle/>
+          <a:p>
+            <a:r>
+              <a:rPr lang="en-US" dirty="0"/>
+              <a:t>Pour </a:t>
+            </a:r>
+            <a:r>
+              <a:rPr lang="fr-FR" dirty="0"/>
+              <a:t>communiquer</a:t>
+            </a:r>
+            <a:r>
+              <a:rPr lang="en-US" dirty="0"/>
+              <a:t> entre </a:t>
+            </a:r>
+            <a:r>
+              <a:rPr lang="fr-FR" dirty="0"/>
+              <a:t>ces</a:t>
+            </a:r>
+            <a:r>
+              <a:rPr lang="en-US" dirty="0"/>
+              <a:t> </a:t>
+            </a:r>
+            <a:r>
+              <a:rPr lang="en-US" dirty="0" err="1"/>
+              <a:t>deux</a:t>
+            </a:r>
+            <a:r>
+              <a:rPr lang="en-US" dirty="0"/>
+              <a:t> </a:t>
+            </a:r>
+            <a:r>
+              <a:rPr lang="fr-FR" dirty="0"/>
+              <a:t>appareils</a:t>
+            </a:r>
+            <a:r>
+              <a:rPr lang="en-US" dirty="0"/>
+              <a:t> </a:t>
+            </a:r>
+            <a:r>
+              <a:rPr lang="en-US" dirty="0" err="1"/>
+              <a:t>il</a:t>
+            </a:r>
+            <a:r>
+              <a:rPr lang="en-US" dirty="0"/>
+              <a:t> </a:t>
+            </a:r>
+            <a:r>
+              <a:rPr lang="en-US" dirty="0" err="1"/>
+              <a:t>suffit</a:t>
+            </a:r>
+            <a:r>
+              <a:rPr lang="en-US" dirty="0"/>
+              <a:t> de les connecter </a:t>
+            </a:r>
+            <a:r>
+              <a:rPr lang="en-US" dirty="0" err="1"/>
+              <a:t>en</a:t>
+            </a:r>
+            <a:r>
+              <a:rPr lang="en-US" dirty="0"/>
+              <a:t> </a:t>
+            </a:r>
+            <a:r>
+              <a:rPr lang="en-US" dirty="0" err="1"/>
+              <a:t>bluetooth</a:t>
+            </a:r>
+            <a:r>
+              <a:rPr lang="en-US" dirty="0"/>
+              <a:t> (</a:t>
+            </a:r>
+            <a:r>
+              <a:rPr lang="en-US" dirty="0" err="1"/>
+              <a:t>il</a:t>
+            </a:r>
+            <a:r>
+              <a:rPr lang="en-US" dirty="0"/>
+              <a:t> </a:t>
+            </a:r>
+            <a:r>
+              <a:rPr lang="en-US" dirty="0" err="1"/>
+              <a:t>faut</a:t>
+            </a:r>
+            <a:r>
+              <a:rPr lang="en-US" dirty="0"/>
+              <a:t> un shield </a:t>
+            </a:r>
+            <a:r>
+              <a:rPr lang="en-US" dirty="0" err="1"/>
+              <a:t>bluetooth</a:t>
+            </a:r>
+            <a:r>
+              <a:rPr lang="en-US" dirty="0"/>
+              <a:t> sur </a:t>
+            </a:r>
+            <a:r>
+              <a:rPr lang="en-US" dirty="0" err="1"/>
+              <a:t>l’arduino</a:t>
+            </a:r>
+            <a:r>
+              <a:rPr lang="en-US" dirty="0"/>
+              <a:t>)</a:t>
+            </a:r>
+          </a:p>
+          <a:p>
+            <a:r>
+              <a:rPr lang="en-US" dirty="0"/>
+              <a:t>Installer </a:t>
+            </a:r>
+            <a:r>
+              <a:rPr lang="en-US" dirty="0" err="1"/>
+              <a:t>l’application</a:t>
+            </a:r>
+            <a:r>
+              <a:rPr lang="en-US" dirty="0"/>
+              <a:t>:</a:t>
+            </a:r>
+          </a:p>
+          <a:p>
+            <a:pPr lvl="1"/>
+            <a:r>
+              <a:rPr lang="en-US" dirty="0"/>
+              <a:t>Arduino Bluetooth Control</a:t>
+            </a:r>
+          </a:p>
+          <a:p>
+            <a:r>
+              <a:rPr lang="en-US" dirty="0"/>
+              <a:t>Grace a </a:t>
+            </a:r>
+            <a:r>
+              <a:rPr lang="en-US" dirty="0" err="1"/>
+              <a:t>cette</a:t>
+            </a:r>
+            <a:r>
+              <a:rPr lang="en-US" dirty="0"/>
+              <a:t> application </a:t>
+            </a:r>
+            <a:r>
+              <a:rPr lang="en-US" dirty="0" err="1"/>
+              <a:t>vous</a:t>
+            </a:r>
+            <a:r>
+              <a:rPr lang="en-US" dirty="0"/>
+              <a:t> </a:t>
+            </a:r>
+            <a:r>
+              <a:rPr lang="en-US" dirty="0" err="1"/>
+              <a:t>pourrez</a:t>
+            </a:r>
+            <a:r>
+              <a:rPr lang="en-US" dirty="0"/>
+              <a:t> meme </a:t>
+            </a:r>
+            <a:r>
+              <a:rPr lang="en-US" dirty="0" err="1"/>
+              <a:t>communiquer</a:t>
+            </a:r>
+            <a:r>
+              <a:rPr lang="en-US" dirty="0"/>
+              <a:t> </a:t>
+            </a:r>
+            <a:r>
+              <a:rPr lang="en-US" dirty="0" err="1"/>
+              <a:t>en</a:t>
+            </a:r>
+            <a:r>
+              <a:rPr lang="en-US" dirty="0"/>
+              <a:t> vocal avec </a:t>
+            </a:r>
+            <a:r>
+              <a:rPr lang="en-US" dirty="0" err="1"/>
+              <a:t>l’arduino</a:t>
+            </a:r>
+            <a:endParaRPr lang="en-US" dirty="0"/>
+          </a:p>
+        </p:txBody>
+      </p:sp>
+      <p:pic>
+        <p:nvPicPr>
+          <p:cNvPr id="9" name="Espace réservé du contenu 8">
+            <a:extLst>
+              <a:ext uri="{FF2B5EF4-FFF2-40B4-BE49-F238E27FC236}">
+                <a16:creationId xmlns:a16="http://schemas.microsoft.com/office/drawing/2014/main" id="{54AE7C2A-5A1F-4E5F-B6FF-747822AB76EF}"/>
+              </a:ext>
+            </a:extLst>
+          </p:cNvPr>
+          <p:cNvPicPr>
+            <a:picLocks noGrp="1" noChangeAspect="1"/>
+          </p:cNvPicPr>
+          <p:nvPr>
+            <p:ph sz="half" idx="2"/>
+          </p:nvPr>
+        </p:nvPicPr>
+        <p:blipFill>
+          <a:blip r:embed="rId2"/>
+          <a:stretch>
+            <a:fillRect/>
+          </a:stretch>
+        </p:blipFill>
+        <p:spPr>
+          <a:xfrm>
+            <a:off x="4505458" y="971550"/>
+            <a:ext cx="6943592" cy="4774769"/>
+          </a:xfrm>
+          <a:prstGeom prst="rect">
+            <a:avLst/>
+          </a:prstGeom>
+        </p:spPr>
+      </p:pic>
+    </p:spTree>
+    <p:extLst>
+      <p:ext uri="{BB962C8B-B14F-4D97-AF65-F5344CB8AC3E}">
+        <p14:creationId xmlns:p14="http://schemas.microsoft.com/office/powerpoint/2010/main" val="1087315877"/>
+      </p:ext>
+    </p:extLst>
+  </p:cSld>
+  <p:clrMapOvr>
+    <a:masterClrMapping/>
+  </p:clrMapOvr>
+</p:sld>
+</file>
+
+<file path=ppt/slides/slide12.xml><?xml version="1.0" encoding="utf-8"?>
+<p:sld xmlns:a="http://schemas.openxmlformats.org/drawingml/2006/main" xmlns:r="http://schemas.openxmlformats.org/officeDocument/2006/relationships" xmlns:p="http://schemas.openxmlformats.org/presentationml/2006/main">
+  <p:cSld>
+    <p:spTree>
+      <p:nvGrpSpPr>
+        <p:cNvPr id="1" name=""/>
+        <p:cNvGrpSpPr/>
+        <p:nvPr/>
+      </p:nvGrpSpPr>
+      <p:grpSpPr>
+        <a:xfrm>
+          <a:off x="0" y="0"/>
+          <a:ext cx="0" cy="0"/>
+          <a:chOff x="0" y="0"/>
+          <a:chExt cx="0" cy="0"/>
+        </a:xfrm>
+      </p:grpSpPr>
+      <p:sp>
+        <p:nvSpPr>
+          <p:cNvPr id="2" name="Titre 1">
+            <a:extLst>
+              <a:ext uri="{FF2B5EF4-FFF2-40B4-BE49-F238E27FC236}">
+                <a16:creationId xmlns:a16="http://schemas.microsoft.com/office/drawing/2014/main" id="{C7F78958-B067-4B58-8D1E-DB1A204D0651}"/>
+              </a:ext>
+            </a:extLst>
+          </p:cNvPr>
+          <p:cNvSpPr>
+            <a:spLocks noGrp="1"/>
+          </p:cNvSpPr>
+          <p:nvPr>
+            <p:ph type="title"/>
+          </p:nvPr>
+        </p:nvSpPr>
+        <p:spPr>
+          <a:xfrm>
+            <a:off x="999887" y="3001302"/>
+            <a:ext cx="4314235" cy="855396"/>
+          </a:xfrm>
+        </p:spPr>
+        <p:txBody>
+          <a:bodyPr/>
+          <a:lstStyle/>
+          <a:p>
+            <a:r>
+              <a:rPr lang="fr-FR" dirty="0"/>
+              <a:t>Code Arduino</a:t>
+            </a:r>
+          </a:p>
+        </p:txBody>
+      </p:sp>
+      <p:sp>
+        <p:nvSpPr>
+          <p:cNvPr id="3" name="Espace réservé du contenu 2">
+            <a:extLst>
+              <a:ext uri="{FF2B5EF4-FFF2-40B4-BE49-F238E27FC236}">
+                <a16:creationId xmlns:a16="http://schemas.microsoft.com/office/drawing/2014/main" id="{C3D2A22B-43B4-471F-AE70-363B2B173C05}"/>
+              </a:ext>
+            </a:extLst>
+          </p:cNvPr>
+          <p:cNvSpPr>
+            <a:spLocks noGrp="1"/>
+          </p:cNvSpPr>
+          <p:nvPr>
+            <p:ph sz="half" idx="1"/>
+          </p:nvPr>
+        </p:nvSpPr>
+        <p:spPr>
+          <a:xfrm>
+            <a:off x="5314122" y="0"/>
+            <a:ext cx="6579703" cy="6858000"/>
+          </a:xfrm>
+        </p:spPr>
+        <p:txBody>
+          <a:bodyPr>
+            <a:normAutofit fontScale="92500" lnSpcReduction="10000"/>
+          </a:bodyPr>
+          <a:lstStyle/>
+          <a:p>
+            <a:pPr marL="0" indent="0">
+              <a:buNone/>
+            </a:pPr>
+            <a:r>
+              <a:rPr lang="fr-FR" dirty="0" err="1"/>
+              <a:t>int</a:t>
+            </a:r>
+            <a:r>
+              <a:rPr lang="fr-FR" dirty="0"/>
+              <a:t> </a:t>
+            </a:r>
+            <a:r>
+              <a:rPr lang="fr-FR" dirty="0" err="1"/>
+              <a:t>pinLed</a:t>
+            </a:r>
+            <a:r>
+              <a:rPr lang="fr-FR" dirty="0"/>
+              <a:t>;</a:t>
+            </a:r>
+          </a:p>
+          <a:p>
+            <a:pPr marL="0" indent="0">
+              <a:buNone/>
+            </a:pPr>
+            <a:r>
+              <a:rPr lang="fr-FR" dirty="0"/>
+              <a:t>String val;</a:t>
+            </a:r>
+          </a:p>
+          <a:p>
+            <a:pPr marL="0" indent="0">
+              <a:buNone/>
+            </a:pPr>
+            <a:r>
+              <a:rPr lang="fr-FR" dirty="0" err="1"/>
+              <a:t>void</a:t>
+            </a:r>
+            <a:r>
+              <a:rPr lang="fr-FR" dirty="0"/>
+              <a:t> setup() {</a:t>
+            </a:r>
+          </a:p>
+          <a:p>
+            <a:pPr marL="0" indent="0">
+              <a:buNone/>
+            </a:pPr>
+            <a:r>
+              <a:rPr lang="fr-FR" dirty="0"/>
+              <a:t>  	</a:t>
+            </a:r>
+            <a:r>
+              <a:rPr lang="fr-FR" dirty="0" err="1"/>
+              <a:t>pinLed</a:t>
+            </a:r>
+            <a:r>
+              <a:rPr lang="fr-FR" dirty="0"/>
+              <a:t> = 13;</a:t>
+            </a:r>
+          </a:p>
+          <a:p>
+            <a:pPr marL="0" indent="0">
+              <a:buNone/>
+            </a:pPr>
+            <a:r>
+              <a:rPr lang="fr-FR" dirty="0"/>
+              <a:t>  	</a:t>
+            </a:r>
+            <a:r>
+              <a:rPr lang="fr-FR" dirty="0" err="1"/>
+              <a:t>pinMode</a:t>
+            </a:r>
+            <a:r>
+              <a:rPr lang="fr-FR" dirty="0"/>
+              <a:t>(13,OUTPUT);</a:t>
+            </a:r>
+          </a:p>
+          <a:p>
+            <a:pPr marL="0" indent="0">
+              <a:buNone/>
+            </a:pPr>
+            <a:r>
+              <a:rPr lang="fr-FR" dirty="0"/>
+              <a:t> 	 </a:t>
+            </a:r>
+            <a:r>
+              <a:rPr lang="fr-FR" dirty="0" err="1"/>
+              <a:t>Serial.begin</a:t>
+            </a:r>
+            <a:r>
+              <a:rPr lang="fr-FR" dirty="0"/>
+              <a:t>(9600);</a:t>
+            </a:r>
+          </a:p>
+          <a:p>
+            <a:pPr marL="0" indent="0">
+              <a:buNone/>
+            </a:pPr>
+            <a:r>
+              <a:rPr lang="fr-FR" dirty="0"/>
+              <a:t>}</a:t>
+            </a:r>
+          </a:p>
+          <a:p>
+            <a:pPr marL="0" indent="0">
+              <a:buNone/>
+            </a:pPr>
+            <a:r>
+              <a:rPr lang="fr-FR" dirty="0" err="1"/>
+              <a:t>void</a:t>
+            </a:r>
+            <a:r>
+              <a:rPr lang="fr-FR" dirty="0"/>
+              <a:t> </a:t>
+            </a:r>
+            <a:r>
+              <a:rPr lang="fr-FR" dirty="0" err="1"/>
+              <a:t>loop</a:t>
+            </a:r>
+            <a:r>
+              <a:rPr lang="fr-FR" dirty="0"/>
+              <a:t>() {</a:t>
+            </a:r>
+          </a:p>
+          <a:p>
+            <a:pPr marL="0" indent="0">
+              <a:buNone/>
+            </a:pPr>
+            <a:r>
+              <a:rPr lang="fr-FR" dirty="0"/>
+              <a:t>  	if(</a:t>
+            </a:r>
+            <a:r>
+              <a:rPr lang="fr-FR" dirty="0" err="1"/>
+              <a:t>Serial.available</a:t>
+            </a:r>
+            <a:r>
+              <a:rPr lang="fr-FR" dirty="0"/>
+              <a:t>()&gt;0){ </a:t>
+            </a:r>
+          </a:p>
+          <a:p>
+            <a:pPr marL="0" indent="0">
+              <a:buNone/>
+            </a:pPr>
+            <a:r>
+              <a:rPr lang="fr-FR" dirty="0"/>
+              <a:t>   			 val=</a:t>
+            </a:r>
+            <a:r>
+              <a:rPr lang="fr-FR" dirty="0" err="1"/>
+              <a:t>Serial.readString</a:t>
+            </a:r>
+            <a:r>
+              <a:rPr lang="fr-FR" dirty="0"/>
+              <a:t>();</a:t>
+            </a:r>
+          </a:p>
+          <a:p>
+            <a:pPr marL="0" indent="0">
+              <a:buNone/>
+            </a:pPr>
+            <a:r>
+              <a:rPr lang="fr-FR" dirty="0"/>
+              <a:t>    			</a:t>
+            </a:r>
+            <a:r>
+              <a:rPr lang="fr-FR" dirty="0" err="1"/>
+              <a:t>Serial.print</a:t>
+            </a:r>
+            <a:r>
+              <a:rPr lang="fr-FR" dirty="0"/>
+              <a:t>(val);</a:t>
+            </a:r>
+          </a:p>
+          <a:p>
+            <a:pPr marL="0" indent="0">
+              <a:buNone/>
+            </a:pPr>
+            <a:r>
+              <a:rPr lang="fr-FR" dirty="0"/>
+              <a:t>    		if(val=="allume"){</a:t>
+            </a:r>
+          </a:p>
+          <a:p>
+            <a:pPr marL="0" indent="0">
+              <a:buNone/>
+            </a:pPr>
+            <a:r>
+              <a:rPr lang="fr-FR" dirty="0"/>
+              <a:t>      			</a:t>
+            </a:r>
+            <a:r>
+              <a:rPr lang="fr-FR" dirty="0" err="1"/>
+              <a:t>digitalWrite</a:t>
+            </a:r>
+            <a:r>
+              <a:rPr lang="fr-FR" dirty="0"/>
+              <a:t>(</a:t>
+            </a:r>
+            <a:r>
+              <a:rPr lang="fr-FR" dirty="0" err="1"/>
+              <a:t>pinLed,HIGH</a:t>
+            </a:r>
+            <a:r>
+              <a:rPr lang="fr-FR" dirty="0"/>
+              <a:t>);</a:t>
+            </a:r>
+          </a:p>
+          <a:p>
+            <a:pPr marL="0" indent="0">
+              <a:buNone/>
+            </a:pPr>
+            <a:r>
+              <a:rPr lang="fr-FR" dirty="0"/>
+              <a:t>    		}</a:t>
+            </a:r>
+            <a:r>
+              <a:rPr lang="fr-FR" dirty="0" err="1"/>
+              <a:t>else</a:t>
+            </a:r>
+            <a:r>
+              <a:rPr lang="fr-FR" dirty="0"/>
+              <a:t> if(val=="éteint"){</a:t>
+            </a:r>
+          </a:p>
+          <a:p>
+            <a:pPr marL="0" indent="0">
+              <a:buNone/>
+            </a:pPr>
+            <a:r>
+              <a:rPr lang="fr-FR" dirty="0"/>
+              <a:t>     		 	</a:t>
+            </a:r>
+            <a:r>
+              <a:rPr lang="fr-FR" dirty="0" err="1"/>
+              <a:t>digitalWrite</a:t>
+            </a:r>
+            <a:r>
+              <a:rPr lang="fr-FR" dirty="0"/>
+              <a:t>(</a:t>
+            </a:r>
+            <a:r>
+              <a:rPr lang="fr-FR" dirty="0" err="1"/>
+              <a:t>pinLed,LOW</a:t>
+            </a:r>
+            <a:r>
+              <a:rPr lang="fr-FR" dirty="0"/>
+              <a:t>);</a:t>
+            </a:r>
+          </a:p>
+          <a:p>
+            <a:pPr marL="0" indent="0">
+              <a:buNone/>
+            </a:pPr>
+            <a:r>
+              <a:rPr lang="fr-FR" dirty="0"/>
+              <a:t>    		}</a:t>
+            </a:r>
+          </a:p>
+          <a:p>
+            <a:pPr marL="0" indent="0">
+              <a:buNone/>
+            </a:pPr>
+            <a:r>
+              <a:rPr lang="fr-FR" dirty="0"/>
+              <a:t> 	}</a:t>
+            </a:r>
+          </a:p>
+          <a:p>
+            <a:pPr marL="0" indent="0">
+              <a:buNone/>
+            </a:pPr>
+            <a:r>
+              <a:rPr lang="fr-FR" dirty="0"/>
+              <a:t>}</a:t>
+            </a:r>
+          </a:p>
+        </p:txBody>
+      </p:sp>
+    </p:spTree>
+    <p:extLst>
+      <p:ext uri="{BB962C8B-B14F-4D97-AF65-F5344CB8AC3E}">
+        <p14:creationId xmlns:p14="http://schemas.microsoft.com/office/powerpoint/2010/main" val="1322065573"/>
+      </p:ext>
+    </p:extLst>
+  </p:cSld>
+  <p:clrMapOvr>
+    <a:masterClrMapping/>
+  </p:clrMapOvr>
+</p:sld>
+</file>
+
+<file path=ppt/slides/slide13.xml><?xml version="1.0" encoding="utf-8"?>
+<p:sld xmlns:a="http://schemas.openxmlformats.org/drawingml/2006/main" xmlns:r="http://schemas.openxmlformats.org/officeDocument/2006/relationships" xmlns:p="http://schemas.openxmlformats.org/presentationml/2006/main">
+  <p:cSld>
+    <p:spTree>
+      <p:nvGrpSpPr>
+        <p:cNvPr id="1" name=""/>
+        <p:cNvGrpSpPr/>
+        <p:nvPr/>
+      </p:nvGrpSpPr>
+      <p:grpSpPr>
+        <a:xfrm>
+          <a:off x="0" y="0"/>
+          <a:ext cx="0" cy="0"/>
+          <a:chOff x="0" y="0"/>
+          <a:chExt cx="0" cy="0"/>
+        </a:xfrm>
+      </p:grpSpPr>
+      <p:sp>
+        <p:nvSpPr>
+          <p:cNvPr id="2" name="Titre 1">
+            <a:extLst>
+              <a:ext uri="{FF2B5EF4-FFF2-40B4-BE49-F238E27FC236}">
                 <a16:creationId xmlns:a16="http://schemas.microsoft.com/office/drawing/2014/main" id="{285578D4-74D9-40BC-B92E-188C26AB6A36}"/>
               </a:ext>
             </a:extLst>
@@ -6975,24 +8472,21 @@
             <p:ph sz="half" idx="1"/>
           </p:nvPr>
         </p:nvSpPr>
-        <p:spPr/>
+        <p:spPr>
+          <a:xfrm>
+            <a:off x="1257300" y="2286000"/>
+            <a:ext cx="10294340" cy="3619500"/>
+          </a:xfrm>
+        </p:spPr>
         <p:txBody>
-          <a:bodyPr/>
+          <a:bodyPr>
+            <a:normAutofit/>
+          </a:bodyPr>
           <a:lstStyle/>
           <a:p>
             <a:r>
               <a:rPr lang="fr-FR" dirty="0"/>
               <a:t>Lien du fichier APK</a:t>
-            </a:r>
-          </a:p>
-          <a:p>
-            <a:pPr lvl="1"/>
-            <a:endParaRPr lang="fr-FR" dirty="0"/>
-          </a:p>
-          <a:p>
-            <a:r>
-              <a:rPr lang="fr-FR" dirty="0"/>
-              <a:t>Lien de l’application Arduino</a:t>
             </a:r>
           </a:p>
           <a:p>
@@ -7001,7 +8495,7 @@
               <a:rPr lang="fr-FR" dirty="0">
                 <a:hlinkClick r:id="rId2"/>
               </a:rPr>
-              <a:t>https://github.com/PandaPoPy/arduino_thinkcode/tree/master/CodeArduino</a:t>
+              <a:t>https://github.com/PandaPoPy/arduino_thinkcode/tree/master/apk%20irondelle</a:t>
             </a:r>
             <a:r>
               <a:rPr lang="fr-FR" dirty="0"/>
@@ -7011,7 +8505,7 @@
           <a:p>
             <a:r>
               <a:rPr lang="fr-FR" dirty="0"/>
-              <a:t>Lien du projet avec les code sources</a:t>
+              <a:t>Lien de l’application Arduino</a:t>
             </a:r>
           </a:p>
           <a:p>
@@ -7020,37 +8514,28 @@
               <a:rPr lang="fr-FR" dirty="0">
                 <a:hlinkClick r:id="rId3"/>
               </a:rPr>
+              <a:t>https://github.com/PandaPoPy/arduino_thinkcode/blob/master/CodeArduino/messageUrgence.ino</a:t>
+            </a:r>
+            <a:endParaRPr lang="fr-FR" dirty="0"/>
+          </a:p>
+          <a:p>
+            <a:r>
+              <a:rPr lang="fr-FR" dirty="0"/>
+              <a:t>Lien du projet avec les code sources</a:t>
+            </a:r>
+          </a:p>
+          <a:p>
+            <a:pPr lvl="1"/>
+            <a:r>
+              <a:rPr lang="fr-FR" dirty="0">
+                <a:hlinkClick r:id="rId4"/>
+              </a:rPr>
               <a:t>https://github.com/PandaPoPy/arduino_thinkcode</a:t>
             </a:r>
             <a:r>
               <a:rPr lang="fr-FR" dirty="0"/>
               <a:t> </a:t>
             </a:r>
-          </a:p>
-        </p:txBody>
-      </p:sp>
-      <p:sp>
-        <p:nvSpPr>
-          <p:cNvPr id="4" name="Espace réservé du contenu 3">
-            <a:extLst>
-              <a:ext uri="{FF2B5EF4-FFF2-40B4-BE49-F238E27FC236}">
-                <a16:creationId xmlns:a16="http://schemas.microsoft.com/office/drawing/2014/main" id="{86E850FE-5DC8-4CD6-9156-D99CEE169B11}"/>
-              </a:ext>
-            </a:extLst>
-          </p:cNvPr>
-          <p:cNvSpPr>
-            <a:spLocks noGrp="1"/>
-          </p:cNvSpPr>
-          <p:nvPr>
-            <p:ph sz="half" idx="2"/>
-          </p:nvPr>
-        </p:nvSpPr>
-        <p:spPr/>
-        <p:txBody>
-          <a:bodyPr/>
-          <a:lstStyle/>
-          <a:p>
-            <a:endParaRPr lang="fr-FR"/>
           </a:p>
         </p:txBody>
       </p:sp>
@@ -7266,46 +8751,20 @@
           <a:p>
             <a:r>
               <a:rPr lang="fr-FR" sz="1600" dirty="0"/>
-              <a:t>Une carte </a:t>
-            </a:r>
-            <a:r>
-              <a:rPr lang="fr-FR" sz="1600" dirty="0" err="1"/>
-              <a:t>arduino</a:t>
-            </a:r>
+              <a:t>Une carte Arduino nano</a:t>
+            </a:r>
+          </a:p>
+          <a:p>
             <a:r>
               <a:rPr lang="fr-FR" sz="1600" dirty="0"/>
-              <a:t> nano</a:t>
+              <a:t>Un Shield Bluetooth</a:t>
             </a:r>
           </a:p>
           <a:p>
             <a:r>
               <a:rPr lang="fr-FR" sz="1600" dirty="0"/>
-              <a:t>Un </a:t>
-            </a:r>
-            <a:r>
-              <a:rPr lang="fr-FR" sz="1600" dirty="0" err="1"/>
-              <a:t>shield</a:t>
-            </a:r>
-            <a:r>
-              <a:rPr lang="fr-FR" sz="1600" dirty="0"/>
-              <a:t> </a:t>
-            </a:r>
-            <a:r>
-              <a:rPr lang="fr-FR" sz="1600" dirty="0" err="1"/>
-              <a:t>bluetooth</a:t>
-            </a:r>
-            <a:endParaRPr lang="fr-FR" sz="1600" dirty="0"/>
-          </a:p>
-          <a:p>
-            <a:r>
-              <a:rPr lang="fr-FR" sz="1600" dirty="0"/>
-              <a:t>Une </a:t>
-            </a:r>
-            <a:r>
-              <a:rPr lang="fr-FR" sz="1600" dirty="0" err="1"/>
-              <a:t>led</a:t>
-            </a:r>
-            <a:endParaRPr lang="fr-FR" sz="1600" dirty="0"/>
+              <a:t>Une led</a:t>
+            </a:r>
           </a:p>
           <a:p>
             <a:r>
@@ -7928,13 +9387,8 @@
           <a:p>
             <a:r>
               <a:rPr lang="fr-FR" dirty="0"/>
-              <a:t>Faire une application </a:t>
-            </a:r>
-            <a:r>
-              <a:rPr lang="fr-FR" dirty="0" err="1"/>
-              <a:t>android</a:t>
-            </a:r>
-            <a:endParaRPr lang="fr-FR" dirty="0"/>
+              <a:t>Faire une application Android</a:t>
+            </a:r>
           </a:p>
         </p:txBody>
       </p:sp>
@@ -7981,10 +9435,9 @@
           <a:p>
             <a:pPr lvl="1"/>
             <a:r>
-              <a:rPr lang="fr-FR" dirty="0" err="1"/>
+              <a:rPr lang="fr-FR" dirty="0"/>
               <a:t>Layout</a:t>
             </a:r>
-            <a:endParaRPr lang="fr-FR" dirty="0"/>
           </a:p>
           <a:p>
             <a:pPr lvl="2"/>
@@ -8076,7 +9529,7 @@
           <p:cNvPr id="2" name="Titre 1">
             <a:extLst>
               <a:ext uri="{FF2B5EF4-FFF2-40B4-BE49-F238E27FC236}">
-                <a16:creationId xmlns:a16="http://schemas.microsoft.com/office/drawing/2014/main" id="{2B8640B8-AB23-44AA-A870-A6B4DA6706D8}"/>
+                <a16:creationId xmlns:a16="http://schemas.microsoft.com/office/drawing/2014/main" id="{EB43AF3F-F4D0-4E13-98C5-9F973C357253}"/>
               </a:ext>
             </a:extLst>
           </p:cNvPr>
@@ -8094,7 +9547,7 @@
           <a:p>
             <a:r>
               <a:rPr lang="fr-FR" dirty="0"/>
-              <a:t>Faire une application ARDUINO</a:t>
+              <a:t>Faire sa première application Android</a:t>
             </a:r>
           </a:p>
         </p:txBody>
@@ -8104,7 +9557,7 @@
           <p:cNvPr id="3" name="Espace réservé du contenu 2">
             <a:extLst>
               <a:ext uri="{FF2B5EF4-FFF2-40B4-BE49-F238E27FC236}">
-                <a16:creationId xmlns:a16="http://schemas.microsoft.com/office/drawing/2014/main" id="{91691596-F4E6-4E46-B382-46F4D98A6D59}"/>
+                <a16:creationId xmlns:a16="http://schemas.microsoft.com/office/drawing/2014/main" id="{8FEE0A1B-A7C5-47A7-B2AA-85402FBE936B}"/>
               </a:ext>
             </a:extLst>
           </p:cNvPr>
@@ -8117,177 +9570,134 @@
         </p:nvSpPr>
         <p:spPr>
           <a:xfrm>
-            <a:off x="1257299" y="2038525"/>
-            <a:ext cx="9161827" cy="4311941"/>
+            <a:off x="1257300" y="2285999"/>
+            <a:ext cx="10325100" cy="4379843"/>
           </a:xfrm>
         </p:spPr>
         <p:txBody>
           <a:bodyPr>
-            <a:normAutofit fontScale="62500" lnSpcReduction="20000"/>
+            <a:normAutofit fontScale="92500" lnSpcReduction="10000"/>
           </a:bodyPr>
           <a:lstStyle/>
           <a:p>
             <a:r>
-              <a:rPr lang="fr-FR" sz="2900" dirty="0"/>
-              <a:t>Commandes importante pour débuter</a:t>
-            </a:r>
-          </a:p>
-          <a:p>
-            <a:pPr lvl="1"/>
-            <a:r>
-              <a:rPr lang="fr-FR" sz="2200" dirty="0" err="1"/>
-              <a:t>pinMode</a:t>
-            </a:r>
-            <a:r>
-              <a:rPr lang="fr-FR" sz="2200" dirty="0"/>
-              <a:t>(</a:t>
-            </a:r>
-            <a:r>
-              <a:rPr lang="fr-FR" sz="2200" dirty="0" err="1"/>
-              <a:t>numeroDeL’emplacement</a:t>
-            </a:r>
-            <a:r>
-              <a:rPr lang="fr-FR" sz="2200" dirty="0"/>
-              <a:t>, OUTPUT ou INPUT)</a:t>
-            </a:r>
-          </a:p>
-          <a:p>
-            <a:pPr lvl="2"/>
-            <a:r>
-              <a:rPr lang="fr-FR" sz="2000" dirty="0"/>
-              <a:t>INPUT pour récupérer la position d’un bouton par exemple</a:t>
-            </a:r>
-          </a:p>
-          <a:p>
-            <a:pPr lvl="2"/>
-            <a:r>
-              <a:rPr lang="fr-FR" sz="2000" dirty="0"/>
-              <a:t>OUTPUT pour éclairer une </a:t>
-            </a:r>
-            <a:r>
-              <a:rPr lang="fr-FR" sz="2000" dirty="0" err="1"/>
-              <a:t>led</a:t>
-            </a:r>
-            <a:r>
-              <a:rPr lang="fr-FR" sz="2000" dirty="0"/>
-              <a:t> par exemple</a:t>
-            </a:r>
-          </a:p>
-          <a:p>
-            <a:pPr lvl="1"/>
-            <a:r>
-              <a:rPr lang="fr-FR" sz="2200" dirty="0" err="1"/>
-              <a:t>digitalRead</a:t>
-            </a:r>
-            <a:r>
-              <a:rPr lang="fr-FR" sz="2200" dirty="0"/>
-              <a:t>(</a:t>
-            </a:r>
-            <a:r>
-              <a:rPr lang="fr-FR" sz="2200" dirty="0" err="1"/>
-              <a:t>numeroDeL’emplacement</a:t>
-            </a:r>
-            <a:r>
-              <a:rPr lang="fr-FR" sz="2200" dirty="0"/>
-              <a:t>)</a:t>
-            </a:r>
-          </a:p>
-          <a:p>
-            <a:pPr lvl="2"/>
-            <a:r>
-              <a:rPr lang="fr-FR" sz="2000" dirty="0"/>
-              <a:t>Permet une récupération de la position du bouton</a:t>
-            </a:r>
-          </a:p>
-          <a:p>
-            <a:pPr lvl="1"/>
-            <a:r>
-              <a:rPr lang="fr-FR" sz="2200" dirty="0"/>
-              <a:t>Déclaration de variable importante</a:t>
-            </a:r>
-          </a:p>
-          <a:p>
-            <a:pPr lvl="2"/>
-            <a:r>
-              <a:rPr lang="fr-FR" sz="2200" dirty="0" err="1"/>
-              <a:t>int</a:t>
-            </a:r>
-            <a:r>
-              <a:rPr lang="fr-FR" sz="2200" dirty="0"/>
-              <a:t> nom = …;</a:t>
-            </a:r>
-          </a:p>
-          <a:p>
-            <a:pPr lvl="3"/>
-            <a:r>
-              <a:rPr lang="fr-FR" sz="2000" dirty="0"/>
-              <a:t>Déclare un nombre entier</a:t>
-            </a:r>
-          </a:p>
-          <a:p>
-            <a:pPr lvl="2"/>
-            <a:r>
-              <a:rPr lang="fr-FR" sz="2200" dirty="0" err="1"/>
-              <a:t>float</a:t>
-            </a:r>
-            <a:r>
-              <a:rPr lang="fr-FR" sz="2200" dirty="0"/>
-              <a:t> nom = …;</a:t>
-            </a:r>
-          </a:p>
-          <a:p>
-            <a:pPr lvl="3"/>
-            <a:r>
-              <a:rPr lang="fr-FR" sz="2000" dirty="0"/>
-              <a:t>Déclare un nombre décimale</a:t>
-            </a:r>
-          </a:p>
-          <a:p>
-            <a:pPr lvl="2"/>
-            <a:r>
-              <a:rPr lang="fr-FR" sz="2200" dirty="0"/>
-              <a:t>String nom = « texte »</a:t>
-            </a:r>
-          </a:p>
-          <a:p>
-            <a:pPr lvl="3"/>
-            <a:r>
-              <a:rPr lang="fr-FR" sz="2000" dirty="0"/>
-              <a:t>Déclare une chaine de caractère</a:t>
-            </a:r>
-          </a:p>
-          <a:p>
-            <a:pPr lvl="1"/>
-            <a:r>
-              <a:rPr lang="fr-FR" sz="2200" dirty="0" err="1"/>
-              <a:t>digitalWrite</a:t>
-            </a:r>
-            <a:r>
-              <a:rPr lang="fr-FR" sz="2200" dirty="0"/>
-              <a:t>(</a:t>
-            </a:r>
-            <a:r>
-              <a:rPr lang="fr-FR" sz="2200" dirty="0" err="1"/>
-              <a:t>numeroDeL’emplacement</a:t>
-            </a:r>
-            <a:r>
-              <a:rPr lang="fr-FR" sz="2200" dirty="0"/>
-              <a:t>, HIGH ou LOW)</a:t>
-            </a:r>
-          </a:p>
-          <a:p>
-            <a:pPr lvl="2"/>
-            <a:r>
-              <a:rPr lang="fr-FR" sz="2200" dirty="0"/>
-              <a:t>Allume ou éteint la </a:t>
-            </a:r>
-            <a:r>
-              <a:rPr lang="fr-FR" sz="2200" dirty="0" err="1"/>
-              <a:t>led</a:t>
-            </a:r>
-            <a:r>
-              <a:rPr lang="fr-FR" sz="2200" dirty="0"/>
-              <a:t> sélectionné</a:t>
+              <a:rPr lang="fr-FR" dirty="0"/>
+              <a:t>Dans le layout principale positionner un vertical layout afin que l’affichage ne bouge plus, puis il suffit de placer vos élément a l’intérieur de ce dernier</a:t>
+            </a:r>
+          </a:p>
+          <a:p>
+            <a:r>
+              <a:rPr lang="fr-FR" dirty="0"/>
+              <a:t>Pour mettre une action sur un bouton il faut récupérer son id puis écrire ceci dans le code java</a:t>
+            </a:r>
+          </a:p>
+          <a:p>
+            <a:pPr marL="0" indent="0">
+              <a:buNone/>
+            </a:pPr>
+            <a:endParaRPr lang="fr-FR" dirty="0"/>
+          </a:p>
+          <a:p>
+            <a:pPr marL="0" indent="0">
+              <a:buNone/>
+            </a:pPr>
+            <a:r>
+              <a:rPr lang="fr-FR" dirty="0"/>
+              <a:t>Button </a:t>
+            </a:r>
+            <a:r>
+              <a:rPr lang="fr-FR" dirty="0">
+                <a:solidFill>
+                  <a:srgbClr val="FF0000"/>
+                </a:solidFill>
+              </a:rPr>
+              <a:t>actBluetooth</a:t>
+            </a:r>
+            <a:r>
+              <a:rPr lang="fr-FR" dirty="0"/>
+              <a:t> = (Button) findViewById(R.id.</a:t>
+            </a:r>
+            <a:r>
+              <a:rPr lang="fr-FR" dirty="0">
+                <a:solidFill>
+                  <a:srgbClr val="FF0000"/>
+                </a:solidFill>
+              </a:rPr>
+              <a:t>button9</a:t>
+            </a:r>
+            <a:r>
+              <a:rPr lang="fr-FR" dirty="0"/>
+              <a:t>);</a:t>
+            </a:r>
+          </a:p>
+          <a:p>
+            <a:pPr marL="0" indent="0">
+              <a:buNone/>
+            </a:pPr>
+            <a:r>
+              <a:rPr lang="fr-FR" dirty="0">
+                <a:solidFill>
+                  <a:srgbClr val="FF0000"/>
+                </a:solidFill>
+              </a:rPr>
+              <a:t>actBluetooth</a:t>
+            </a:r>
+            <a:r>
+              <a:rPr lang="fr-FR" dirty="0"/>
+              <a:t>.setOnClickListener(</a:t>
+            </a:r>
+          </a:p>
+          <a:p>
+            <a:pPr marL="0" indent="0">
+              <a:buNone/>
+            </a:pPr>
+            <a:r>
+              <a:rPr lang="fr-FR" dirty="0"/>
+              <a:t>	new View.OnClickListener() {</a:t>
+            </a:r>
+          </a:p>
+          <a:p>
+            <a:pPr marL="0" indent="0">
+              <a:buNone/>
+            </a:pPr>
+            <a:r>
+              <a:rPr lang="fr-FR" dirty="0"/>
+              <a:t>                    @Override</a:t>
+            </a:r>
+          </a:p>
+          <a:p>
+            <a:pPr marL="0" indent="0">
+              <a:buNone/>
+            </a:pPr>
+            <a:r>
+              <a:rPr lang="fr-FR" dirty="0"/>
+              <a:t>                    public void onClick(View v) {</a:t>
+            </a:r>
+          </a:p>
+          <a:p>
+            <a:pPr marL="0" indent="0">
+              <a:buNone/>
+            </a:pPr>
+            <a:r>
+              <a:rPr lang="fr-FR" dirty="0"/>
+              <a:t>                        </a:t>
+            </a:r>
+            <a:r>
+              <a:rPr lang="fr-FR" dirty="0">
+                <a:solidFill>
+                  <a:srgbClr val="FF0000"/>
+                </a:solidFill>
+              </a:rPr>
+              <a:t>Programme a faire</a:t>
+            </a:r>
+          </a:p>
+          <a:p>
+            <a:pPr marL="0" indent="0">
+              <a:buNone/>
+            </a:pPr>
+            <a:r>
+              <a:rPr lang="fr-FR" dirty="0"/>
+              <a:t>                    }});</a:t>
             </a:r>
           </a:p>
         </p:txBody>
@@ -8295,7 +9705,7 @@
     </p:spTree>
     <p:extLst>
       <p:ext uri="{BB962C8B-B14F-4D97-AF65-F5344CB8AC3E}">
-        <p14:creationId xmlns:p14="http://schemas.microsoft.com/office/powerpoint/2010/main" val="2044492439"/>
+        <p14:creationId xmlns:p14="http://schemas.microsoft.com/office/powerpoint/2010/main" val="426838512"/>
       </p:ext>
     </p:extLst>
   </p:cSld>
@@ -8327,7 +9737,7 @@
           <p:cNvPr id="2" name="Titre 1">
             <a:extLst>
               <a:ext uri="{FF2B5EF4-FFF2-40B4-BE49-F238E27FC236}">
-                <a16:creationId xmlns:a16="http://schemas.microsoft.com/office/drawing/2014/main" id="{ECF3205A-52EA-4FB9-B6D3-BE6C041C547E}"/>
+                <a16:creationId xmlns:a16="http://schemas.microsoft.com/office/drawing/2014/main" id="{2B8640B8-AB23-44AA-A870-A6B4DA6706D8}"/>
               </a:ext>
             </a:extLst>
           </p:cNvPr>
@@ -8338,62 +9748,24 @@
             <p:ph type="title"/>
           </p:nvPr>
         </p:nvSpPr>
-        <p:spPr>
-          <a:xfrm>
-            <a:off x="1251678" y="382385"/>
-            <a:ext cx="10178322" cy="1492132"/>
-          </a:xfrm>
-        </p:spPr>
+        <p:spPr/>
         <p:txBody>
           <a:bodyPr/>
           <a:lstStyle/>
           <a:p>
             <a:r>
-              <a:rPr lang="fr-FR"/>
-              <a:t>Branchement et code arduino</a:t>
-            </a:r>
-            <a:endParaRPr lang="fr-FR" dirty="0"/>
+              <a:rPr lang="fr-FR" dirty="0"/>
+              <a:t>Faire une application ARDUINO</a:t>
+            </a:r>
           </a:p>
         </p:txBody>
       </p:sp>
-      <p:pic>
-        <p:nvPicPr>
-          <p:cNvPr id="5" name="Espace réservé du contenu 4">
+      <p:sp>
+        <p:nvSpPr>
+          <p:cNvPr id="3" name="Espace réservé du contenu 2">
             <a:extLst>
               <a:ext uri="{FF2B5EF4-FFF2-40B4-BE49-F238E27FC236}">
-                <a16:creationId xmlns:a16="http://schemas.microsoft.com/office/drawing/2014/main" id="{15BC3C2B-3775-4611-97D2-254FA42E01F7}"/>
-              </a:ext>
-            </a:extLst>
-          </p:cNvPr>
-          <p:cNvPicPr>
-            <a:picLocks noGrp="1" noChangeAspect="1"/>
-          </p:cNvPicPr>
-          <p:nvPr>
-            <p:ph sz="half" idx="1"/>
-          </p:nvPr>
-        </p:nvPicPr>
-        <p:blipFill>
-          <a:blip r:embed="rId2"/>
-          <a:stretch>
-            <a:fillRect/>
-          </a:stretch>
-        </p:blipFill>
-        <p:spPr>
-          <a:xfrm>
-            <a:off x="893229" y="2500313"/>
-            <a:ext cx="5164671" cy="2980753"/>
-          </a:xfrm>
-          <a:prstGeom prst="rect">
-            <a:avLst/>
-          </a:prstGeom>
-        </p:spPr>
-      </p:pic>
-      <p:sp>
-        <p:nvSpPr>
-          <p:cNvPr id="4" name="Espace réservé du contenu 3">
-            <a:extLst>
-              <a:ext uri="{FF2B5EF4-FFF2-40B4-BE49-F238E27FC236}">
-                <a16:creationId xmlns:a16="http://schemas.microsoft.com/office/drawing/2014/main" id="{1E1165C3-D182-40D9-9AEE-4D387EC57A12}"/>
+                <a16:creationId xmlns:a16="http://schemas.microsoft.com/office/drawing/2014/main" id="{91691596-F4E6-4E46-B382-46F4D98A6D59}"/>
               </a:ext>
             </a:extLst>
           </p:cNvPr>
@@ -8401,336 +9773,122 @@
             <a:spLocks noGrp="1"/>
           </p:cNvSpPr>
           <p:nvPr>
-            <p:ph sz="half" idx="2"/>
+            <p:ph sz="half" idx="1"/>
           </p:nvPr>
         </p:nvSpPr>
         <p:spPr>
           <a:xfrm>
-            <a:off x="6334059" y="1354578"/>
-            <a:ext cx="5164671" cy="5503422"/>
+            <a:off x="1257299" y="2038525"/>
+            <a:ext cx="9161827" cy="4311941"/>
           </a:xfrm>
         </p:spPr>
         <p:txBody>
           <a:bodyPr>
-            <a:noAutofit/>
+            <a:normAutofit fontScale="62500" lnSpcReduction="20000"/>
           </a:bodyPr>
           <a:lstStyle/>
           <a:p>
-            <a:pPr marL="0" indent="0">
-              <a:buNone/>
-            </a:pPr>
-            <a:r>
-              <a:rPr lang="fr-FR" sz="1200" dirty="0"/>
-              <a:t>Exemple : </a:t>
-            </a:r>
-          </a:p>
-          <a:p>
-            <a:pPr marL="0" indent="0">
-              <a:buNone/>
-            </a:pPr>
-            <a:r>
-              <a:rPr lang="fr-FR" sz="1200" dirty="0" err="1"/>
-              <a:t>int</a:t>
-            </a:r>
-            <a:r>
-              <a:rPr lang="fr-FR" sz="1200" dirty="0"/>
-              <a:t> </a:t>
-            </a:r>
-            <a:r>
-              <a:rPr lang="fr-FR" sz="1200" dirty="0" err="1"/>
-              <a:t>buttonPin</a:t>
-            </a:r>
-            <a:r>
-              <a:rPr lang="fr-FR" sz="1200" dirty="0"/>
-              <a:t> = 2;    </a:t>
-            </a:r>
-          </a:p>
-          <a:p>
-            <a:pPr marL="0" indent="0">
-              <a:buNone/>
-            </a:pPr>
-            <a:r>
-              <a:rPr lang="fr-FR" sz="1200" dirty="0" err="1"/>
-              <a:t>int</a:t>
-            </a:r>
-            <a:r>
-              <a:rPr lang="fr-FR" sz="1200" dirty="0"/>
-              <a:t> </a:t>
-            </a:r>
-            <a:r>
-              <a:rPr lang="fr-FR" sz="1200" dirty="0" err="1"/>
-              <a:t>ledPin</a:t>
-            </a:r>
-            <a:r>
-              <a:rPr lang="fr-FR" sz="1200" dirty="0"/>
-              <a:t> =  13;      </a:t>
-            </a:r>
-          </a:p>
-          <a:p>
-            <a:pPr marL="0" indent="0">
-              <a:buNone/>
-            </a:pPr>
-            <a:endParaRPr lang="fr-FR" sz="1200" dirty="0"/>
-          </a:p>
-          <a:p>
-            <a:pPr marL="0" indent="0">
-              <a:buNone/>
-            </a:pPr>
-            <a:r>
-              <a:rPr lang="fr-FR" sz="1200" dirty="0" err="1"/>
-              <a:t>int</a:t>
-            </a:r>
-            <a:r>
-              <a:rPr lang="fr-FR" sz="1200" dirty="0"/>
-              <a:t> </a:t>
-            </a:r>
-            <a:r>
-              <a:rPr lang="fr-FR" sz="1200" dirty="0" err="1"/>
-              <a:t>buttonState</a:t>
-            </a:r>
-            <a:r>
-              <a:rPr lang="fr-FR" sz="1200" dirty="0"/>
-              <a:t> = 0;</a:t>
-            </a:r>
-          </a:p>
-          <a:p>
-            <a:pPr marL="0" indent="0">
-              <a:buNone/>
-            </a:pPr>
-            <a:endParaRPr lang="fr-FR" sz="1200" dirty="0"/>
-          </a:p>
-          <a:p>
-            <a:pPr marL="0" indent="0">
-              <a:buNone/>
-            </a:pPr>
-            <a:r>
-              <a:rPr lang="fr-FR" sz="1200" dirty="0" err="1"/>
-              <a:t>void</a:t>
-            </a:r>
-            <a:r>
-              <a:rPr lang="fr-FR" sz="1200" dirty="0"/>
-              <a:t> setup() {</a:t>
-            </a:r>
-          </a:p>
-          <a:p>
-            <a:pPr marL="0" indent="0">
-              <a:buNone/>
-            </a:pPr>
-            <a:r>
-              <a:rPr lang="fr-FR" sz="1200" dirty="0"/>
-              <a:t>          </a:t>
-            </a:r>
-            <a:r>
-              <a:rPr lang="fr-FR" sz="1200" dirty="0" err="1"/>
-              <a:t>pinMode</a:t>
-            </a:r>
-            <a:r>
-              <a:rPr lang="fr-FR" sz="1200" dirty="0"/>
-              <a:t>(</a:t>
-            </a:r>
-            <a:r>
-              <a:rPr lang="fr-FR" sz="1200" dirty="0" err="1"/>
-              <a:t>ledPin</a:t>
-            </a:r>
-            <a:r>
-              <a:rPr lang="fr-FR" sz="1200" dirty="0"/>
-              <a:t>, OUTPUT);</a:t>
-            </a:r>
-          </a:p>
-          <a:p>
-            <a:pPr marL="0" indent="0">
-              <a:buNone/>
-            </a:pPr>
-            <a:r>
-              <a:rPr lang="fr-FR" sz="1200" dirty="0"/>
-              <a:t>          </a:t>
-            </a:r>
-            <a:r>
-              <a:rPr lang="fr-FR" sz="1200" dirty="0" err="1"/>
-              <a:t>pinMode</a:t>
-            </a:r>
-            <a:r>
-              <a:rPr lang="fr-FR" sz="1200" dirty="0"/>
-              <a:t>(</a:t>
-            </a:r>
-            <a:r>
-              <a:rPr lang="fr-FR" sz="1200" dirty="0" err="1"/>
-              <a:t>buttonPin</a:t>
-            </a:r>
-            <a:r>
-              <a:rPr lang="fr-FR" sz="1200" dirty="0"/>
-              <a:t>, INPUT);</a:t>
-            </a:r>
-          </a:p>
-          <a:p>
-            <a:pPr marL="0" indent="0">
-              <a:buNone/>
-            </a:pPr>
-            <a:r>
-              <a:rPr lang="fr-FR" sz="1200" dirty="0"/>
-              <a:t>}</a:t>
-            </a:r>
-          </a:p>
-          <a:p>
-            <a:pPr marL="0" indent="0">
-              <a:buNone/>
-            </a:pPr>
-            <a:endParaRPr lang="fr-FR" sz="1200" dirty="0"/>
-          </a:p>
-          <a:p>
-            <a:pPr marL="0" indent="0">
-              <a:buNone/>
-            </a:pPr>
-            <a:r>
-              <a:rPr lang="fr-FR" sz="1200" dirty="0" err="1"/>
-              <a:t>void</a:t>
-            </a:r>
-            <a:r>
-              <a:rPr lang="fr-FR" sz="1200" dirty="0"/>
-              <a:t> </a:t>
-            </a:r>
-            <a:r>
-              <a:rPr lang="fr-FR" sz="1200" dirty="0" err="1"/>
-              <a:t>loop</a:t>
-            </a:r>
-            <a:r>
-              <a:rPr lang="fr-FR" sz="1200" dirty="0"/>
-              <a:t>() {</a:t>
-            </a:r>
-          </a:p>
-          <a:p>
-            <a:pPr marL="0" indent="0">
-              <a:buNone/>
-            </a:pPr>
-            <a:r>
-              <a:rPr lang="fr-FR" sz="1200" dirty="0"/>
-              <a:t>          </a:t>
-            </a:r>
-            <a:r>
-              <a:rPr lang="fr-FR" sz="1200" dirty="0" err="1"/>
-              <a:t>buttonState</a:t>
-            </a:r>
-            <a:r>
-              <a:rPr lang="fr-FR" sz="1200" dirty="0"/>
-              <a:t> = </a:t>
-            </a:r>
-            <a:r>
-              <a:rPr lang="fr-FR" sz="1200" dirty="0" err="1"/>
-              <a:t>digitalRead</a:t>
-            </a:r>
-            <a:r>
-              <a:rPr lang="fr-FR" sz="1200" dirty="0"/>
-              <a:t>(</a:t>
-            </a:r>
-            <a:r>
-              <a:rPr lang="fr-FR" sz="1200" dirty="0" err="1"/>
-              <a:t>buttonPin</a:t>
-            </a:r>
-            <a:r>
-              <a:rPr lang="fr-FR" sz="1200" dirty="0"/>
-              <a:t>);</a:t>
-            </a:r>
-          </a:p>
-          <a:p>
-            <a:pPr marL="0" indent="0">
-              <a:buNone/>
-            </a:pPr>
-            <a:r>
-              <a:rPr lang="fr-FR" sz="1200" dirty="0"/>
-              <a:t>          if (</a:t>
-            </a:r>
-            <a:r>
-              <a:rPr lang="fr-FR" sz="1200" dirty="0" err="1"/>
-              <a:t>buttonState</a:t>
-            </a:r>
-            <a:r>
-              <a:rPr lang="fr-FR" sz="1200" dirty="0"/>
-              <a:t> == HIGH) {</a:t>
-            </a:r>
-          </a:p>
-          <a:p>
-            <a:pPr marL="0" indent="0">
-              <a:buNone/>
-            </a:pPr>
-            <a:r>
-              <a:rPr lang="fr-FR" sz="1200" dirty="0"/>
-              <a:t>                </a:t>
-            </a:r>
-            <a:r>
-              <a:rPr lang="fr-FR" sz="1200" dirty="0" err="1"/>
-              <a:t>digitalWrite</a:t>
-            </a:r>
-            <a:r>
-              <a:rPr lang="fr-FR" sz="1200" dirty="0"/>
-              <a:t>(</a:t>
-            </a:r>
-            <a:r>
-              <a:rPr lang="fr-FR" sz="1200" dirty="0" err="1"/>
-              <a:t>ledPin</a:t>
-            </a:r>
-            <a:r>
-              <a:rPr lang="fr-FR" sz="1200" dirty="0"/>
-              <a:t>, HIGH);</a:t>
-            </a:r>
-          </a:p>
-          <a:p>
-            <a:pPr marL="0" indent="0">
-              <a:buNone/>
-            </a:pPr>
-            <a:r>
-              <a:rPr lang="fr-FR" sz="1200" dirty="0"/>
-              <a:t>           } </a:t>
-            </a:r>
-            <a:r>
-              <a:rPr lang="fr-FR" sz="1200" dirty="0" err="1"/>
-              <a:t>else</a:t>
-            </a:r>
-            <a:r>
-              <a:rPr lang="fr-FR" sz="1200" dirty="0"/>
-              <a:t> {</a:t>
-            </a:r>
-          </a:p>
-          <a:p>
-            <a:pPr marL="0" indent="0">
-              <a:buNone/>
-            </a:pPr>
-            <a:r>
-              <a:rPr lang="fr-FR" sz="1200" dirty="0"/>
-              <a:t>                 </a:t>
-            </a:r>
-            <a:r>
-              <a:rPr lang="fr-FR" sz="1200" dirty="0" err="1"/>
-              <a:t>digitalWrite</a:t>
-            </a:r>
-            <a:r>
-              <a:rPr lang="fr-FR" sz="1200" dirty="0"/>
-              <a:t>(</a:t>
-            </a:r>
-            <a:r>
-              <a:rPr lang="fr-FR" sz="1200" dirty="0" err="1"/>
-              <a:t>ledPin</a:t>
-            </a:r>
-            <a:r>
-              <a:rPr lang="fr-FR" sz="1200" dirty="0"/>
-              <a:t>, LOW);</a:t>
-            </a:r>
-          </a:p>
-          <a:p>
-            <a:pPr marL="0" indent="0">
-              <a:buNone/>
-            </a:pPr>
-            <a:r>
-              <a:rPr lang="fr-FR" sz="1200" dirty="0"/>
-              <a:t>            }</a:t>
-            </a:r>
-          </a:p>
-          <a:p>
-            <a:pPr marL="0" indent="0">
-              <a:buNone/>
-            </a:pPr>
-            <a:r>
-              <a:rPr lang="fr-FR" sz="1200" dirty="0"/>
-              <a:t>}</a:t>
+            <a:r>
+              <a:rPr lang="fr-FR" sz="2900" dirty="0"/>
+              <a:t>Commandes importante pour débuter</a:t>
+            </a:r>
+          </a:p>
+          <a:p>
+            <a:pPr lvl="1"/>
+            <a:r>
+              <a:rPr lang="fr-FR" sz="2200" dirty="0"/>
+              <a:t>pinMode(numeroDeL’emplacement, OUTPUT ou INPUT)</a:t>
+            </a:r>
+          </a:p>
+          <a:p>
+            <a:pPr lvl="2"/>
+            <a:r>
+              <a:rPr lang="fr-FR" sz="2000" dirty="0"/>
+              <a:t>INPUT pour récupérer la position d’un bouton par exemple</a:t>
+            </a:r>
+          </a:p>
+          <a:p>
+            <a:pPr lvl="2"/>
+            <a:r>
+              <a:rPr lang="fr-FR" sz="2000" dirty="0"/>
+              <a:t>OUTPUT pour éclairer une led par exemple</a:t>
+            </a:r>
+          </a:p>
+          <a:p>
+            <a:pPr lvl="1"/>
+            <a:r>
+              <a:rPr lang="fr-FR" sz="2200" dirty="0"/>
+              <a:t>digitalRead(numeroDeL’emplacement)</a:t>
+            </a:r>
+          </a:p>
+          <a:p>
+            <a:pPr lvl="2"/>
+            <a:r>
+              <a:rPr lang="fr-FR" sz="2000" dirty="0"/>
+              <a:t>Permet une récupération de la position du bouton</a:t>
+            </a:r>
+          </a:p>
+          <a:p>
+            <a:pPr lvl="1"/>
+            <a:r>
+              <a:rPr lang="fr-FR" sz="2200" dirty="0"/>
+              <a:t>Déclaration de variable importante</a:t>
+            </a:r>
+          </a:p>
+          <a:p>
+            <a:pPr lvl="2"/>
+            <a:r>
+              <a:rPr lang="fr-FR" sz="2200" dirty="0"/>
+              <a:t>int nom = …;</a:t>
+            </a:r>
+          </a:p>
+          <a:p>
+            <a:pPr lvl="3"/>
+            <a:r>
+              <a:rPr lang="fr-FR" sz="2000" dirty="0"/>
+              <a:t>Déclare un nombre entier</a:t>
+            </a:r>
+          </a:p>
+          <a:p>
+            <a:pPr lvl="2"/>
+            <a:r>
+              <a:rPr lang="fr-FR" sz="2200" dirty="0"/>
+              <a:t>float nom = …;</a:t>
+            </a:r>
+          </a:p>
+          <a:p>
+            <a:pPr lvl="3"/>
+            <a:r>
+              <a:rPr lang="fr-FR" sz="2000" dirty="0"/>
+              <a:t>Déclare un nombre décimale</a:t>
+            </a:r>
+          </a:p>
+          <a:p>
+            <a:pPr lvl="2"/>
+            <a:r>
+              <a:rPr lang="fr-FR" sz="2200" dirty="0"/>
+              <a:t>String nom = « texte »</a:t>
+            </a:r>
+          </a:p>
+          <a:p>
+            <a:pPr lvl="3"/>
+            <a:r>
+              <a:rPr lang="fr-FR" sz="2000" dirty="0"/>
+              <a:t>Déclare une chaine de caractère</a:t>
+            </a:r>
+          </a:p>
+          <a:p>
+            <a:pPr lvl="1"/>
+            <a:r>
+              <a:rPr lang="fr-FR" sz="2200" dirty="0"/>
+              <a:t>digitalWrite(numeroDeL’emplacement, HIGH ou LOW)</a:t>
+            </a:r>
+          </a:p>
+          <a:p>
+            <a:pPr lvl="2"/>
+            <a:r>
+              <a:rPr lang="fr-FR" sz="2200" dirty="0"/>
+              <a:t>Allume ou éteint la led sélectionné</a:t>
             </a:r>
           </a:p>
         </p:txBody>
@@ -8738,7 +9896,7 @@
     </p:spTree>
     <p:extLst>
       <p:ext uri="{BB962C8B-B14F-4D97-AF65-F5344CB8AC3E}">
-        <p14:creationId xmlns:p14="http://schemas.microsoft.com/office/powerpoint/2010/main" val="3687619800"/>
+        <p14:creationId xmlns:p14="http://schemas.microsoft.com/office/powerpoint/2010/main" val="2044492439"/>
       </p:ext>
     </p:extLst>
   </p:cSld>

</xml_diff>

<commit_message>
ajout de la mini breadboard au cours
</commit_message>
<xml_diff>
--- a/cours/Irondelle.pptx
+++ b/cours/Irondelle.pptx
@@ -312,7 +312,7 @@
           <a:p>
             <a:fld id="{065F3140-87E1-4878-A2FB-1306ED21F06D}" type="datetimeFigureOut">
               <a:rPr lang="fr-FR" smtClean="0"/>
-              <a:t>05/02/2018</a:t>
+              <a:t>07/02/2018</a:t>
             </a:fld>
             <a:endParaRPr lang="fr-FR" dirty="0"/>
           </a:p>
@@ -457,13 +457,13 @@
   <p:clrMapOvr>
     <a:masterClrMapping/>
   </p:clrMapOvr>
-  <mc:AlternateContent xmlns:mc="http://schemas.openxmlformats.org/markup-compatibility/2006">
-    <mc:Choice xmlns:p14="http://schemas.microsoft.com/office/powerpoint/2010/main" Requires="p14">
+  <mc:AlternateContent xmlns:mc="http://schemas.openxmlformats.org/markup-compatibility/2006" xmlns:p14="http://schemas.microsoft.com/office/powerpoint/2010/main">
+    <mc:Choice Requires="p14">
       <p:transition spd="slow" p14:dur="800">
         <p14:flythrough/>
       </p:transition>
     </mc:Choice>
-    <mc:Fallback>
+    <mc:Fallback xmlns="">
       <p:transition spd="slow">
         <p:fade/>
       </p:transition>
@@ -662,7 +662,7 @@
           <a:p>
             <a:fld id="{065F3140-87E1-4878-A2FB-1306ED21F06D}" type="datetimeFigureOut">
               <a:rPr lang="fr-FR" smtClean="0"/>
-              <a:t>05/02/2018</a:t>
+              <a:t>07/02/2018</a:t>
             </a:fld>
             <a:endParaRPr lang="fr-FR" dirty="0"/>
           </a:p>
@@ -807,13 +807,13 @@
   <p:clrMapOvr>
     <a:masterClrMapping/>
   </p:clrMapOvr>
-  <mc:AlternateContent xmlns:mc="http://schemas.openxmlformats.org/markup-compatibility/2006">
-    <mc:Choice xmlns:p14="http://schemas.microsoft.com/office/powerpoint/2010/main" Requires="p14">
+  <mc:AlternateContent xmlns:mc="http://schemas.openxmlformats.org/markup-compatibility/2006" xmlns:p14="http://schemas.microsoft.com/office/powerpoint/2010/main">
+    <mc:Choice Requires="p14">
       <p:transition spd="slow" p14:dur="800">
         <p14:flythrough/>
       </p:transition>
     </mc:Choice>
-    <mc:Fallback>
+    <mc:Fallback xmlns="">
       <p:transition spd="slow">
         <p:fade/>
       </p:transition>
@@ -1075,7 +1075,7 @@
           <a:p>
             <a:fld id="{065F3140-87E1-4878-A2FB-1306ED21F06D}" type="datetimeFigureOut">
               <a:rPr lang="fr-FR" smtClean="0"/>
-              <a:t>05/02/2018</a:t>
+              <a:t>07/02/2018</a:t>
             </a:fld>
             <a:endParaRPr lang="fr-FR" dirty="0"/>
           </a:p>
@@ -1296,13 +1296,13 @@
   <p:clrMapOvr>
     <a:masterClrMapping/>
   </p:clrMapOvr>
-  <mc:AlternateContent xmlns:mc="http://schemas.openxmlformats.org/markup-compatibility/2006">
-    <mc:Choice xmlns:p14="http://schemas.microsoft.com/office/powerpoint/2010/main" Requires="p14">
+  <mc:AlternateContent xmlns:mc="http://schemas.openxmlformats.org/markup-compatibility/2006" xmlns:p14="http://schemas.microsoft.com/office/powerpoint/2010/main">
+    <mc:Choice Requires="p14">
       <p:transition spd="slow" p14:dur="800">
         <p14:flythrough/>
       </p:transition>
     </mc:Choice>
-    <mc:Fallback>
+    <mc:Fallback xmlns="">
       <p:transition spd="slow">
         <p:fade/>
       </p:transition>
@@ -1423,7 +1423,7 @@
           <a:p>
             <a:fld id="{065F3140-87E1-4878-A2FB-1306ED21F06D}" type="datetimeFigureOut">
               <a:rPr lang="fr-FR" smtClean="0"/>
-              <a:t>05/02/2018</a:t>
+              <a:t>07/02/2018</a:t>
             </a:fld>
             <a:endParaRPr lang="fr-FR" dirty="0"/>
           </a:p>
@@ -1568,13 +1568,13 @@
   <p:clrMapOvr>
     <a:masterClrMapping/>
   </p:clrMapOvr>
-  <mc:AlternateContent xmlns:mc="http://schemas.openxmlformats.org/markup-compatibility/2006">
-    <mc:Choice xmlns:p14="http://schemas.microsoft.com/office/powerpoint/2010/main" Requires="p14">
+  <mc:AlternateContent xmlns:mc="http://schemas.openxmlformats.org/markup-compatibility/2006" xmlns:p14="http://schemas.microsoft.com/office/powerpoint/2010/main">
+    <mc:Choice Requires="p14">
       <p:transition spd="slow" p14:dur="800">
         <p14:flythrough/>
       </p:transition>
     </mc:Choice>
-    <mc:Fallback>
+    <mc:Fallback xmlns="">
       <p:transition spd="slow">
         <p:fade/>
       </p:transition>
@@ -1755,7 +1755,7 @@
           <a:p>
             <a:fld id="{065F3140-87E1-4878-A2FB-1306ED21F06D}" type="datetimeFigureOut">
               <a:rPr lang="fr-FR" smtClean="0"/>
-              <a:t>05/02/2018</a:t>
+              <a:t>07/02/2018</a:t>
             </a:fld>
             <a:endParaRPr lang="fr-FR" dirty="0"/>
           </a:p>
@@ -1976,13 +1976,13 @@
   <p:clrMapOvr>
     <a:masterClrMapping/>
   </p:clrMapOvr>
-  <mc:AlternateContent xmlns:mc="http://schemas.openxmlformats.org/markup-compatibility/2006">
-    <mc:Choice xmlns:p14="http://schemas.microsoft.com/office/powerpoint/2010/main" Requires="p14">
+  <mc:AlternateContent xmlns:mc="http://schemas.openxmlformats.org/markup-compatibility/2006" xmlns:p14="http://schemas.microsoft.com/office/powerpoint/2010/main">
+    <mc:Choice Requires="p14">
       <p:transition spd="slow" p14:dur="800">
         <p14:flythrough/>
       </p:transition>
     </mc:Choice>
-    <mc:Fallback>
+    <mc:Fallback xmlns="">
       <p:transition spd="slow">
         <p:fade/>
       </p:transition>
@@ -2163,7 +2163,7 @@
           <a:p>
             <a:fld id="{065F3140-87E1-4878-A2FB-1306ED21F06D}" type="datetimeFigureOut">
               <a:rPr lang="fr-FR" smtClean="0"/>
-              <a:t>05/02/2018</a:t>
+              <a:t>07/02/2018</a:t>
             </a:fld>
             <a:endParaRPr lang="fr-FR" dirty="0"/>
           </a:p>
@@ -2308,13 +2308,13 @@
   <p:clrMapOvr>
     <a:masterClrMapping/>
   </p:clrMapOvr>
-  <mc:AlternateContent xmlns:mc="http://schemas.openxmlformats.org/markup-compatibility/2006">
-    <mc:Choice xmlns:p14="http://schemas.microsoft.com/office/powerpoint/2010/main" Requires="p14">
+  <mc:AlternateContent xmlns:mc="http://schemas.openxmlformats.org/markup-compatibility/2006" xmlns:p14="http://schemas.microsoft.com/office/powerpoint/2010/main">
+    <mc:Choice Requires="p14">
       <p:transition spd="slow" p14:dur="800">
         <p14:flythrough/>
       </p:transition>
     </mc:Choice>
-    <mc:Fallback>
+    <mc:Fallback xmlns="">
       <p:transition spd="slow">
         <p:fade/>
       </p:transition>
@@ -2432,7 +2432,7 @@
           <a:p>
             <a:fld id="{065F3140-87E1-4878-A2FB-1306ED21F06D}" type="datetimeFigureOut">
               <a:rPr lang="fr-FR" smtClean="0"/>
-              <a:t>05/02/2018</a:t>
+              <a:t>07/02/2018</a:t>
             </a:fld>
             <a:endParaRPr lang="fr-FR" dirty="0"/>
           </a:p>
@@ -2572,13 +2572,13 @@
   <p:clrMapOvr>
     <a:masterClrMapping/>
   </p:clrMapOvr>
-  <mc:AlternateContent xmlns:mc="http://schemas.openxmlformats.org/markup-compatibility/2006">
-    <mc:Choice xmlns:p14="http://schemas.microsoft.com/office/powerpoint/2010/main" Requires="p14">
+  <mc:AlternateContent xmlns:mc="http://schemas.openxmlformats.org/markup-compatibility/2006" xmlns:p14="http://schemas.microsoft.com/office/powerpoint/2010/main">
+    <mc:Choice Requires="p14">
       <p:transition spd="slow" p14:dur="800">
         <p14:flythrough/>
       </p:transition>
     </mc:Choice>
-    <mc:Fallback>
+    <mc:Fallback xmlns="">
       <p:transition spd="slow">
         <p:fade/>
       </p:transition>
@@ -2706,7 +2706,7 @@
           <a:p>
             <a:fld id="{065F3140-87E1-4878-A2FB-1306ED21F06D}" type="datetimeFigureOut">
               <a:rPr lang="fr-FR" smtClean="0"/>
-              <a:t>05/02/2018</a:t>
+              <a:t>07/02/2018</a:t>
             </a:fld>
             <a:endParaRPr lang="fr-FR" dirty="0"/>
           </a:p>
@@ -2846,13 +2846,13 @@
   <p:clrMapOvr>
     <a:masterClrMapping/>
   </p:clrMapOvr>
-  <mc:AlternateContent xmlns:mc="http://schemas.openxmlformats.org/markup-compatibility/2006">
-    <mc:Choice xmlns:p14="http://schemas.microsoft.com/office/powerpoint/2010/main" Requires="p14">
+  <mc:AlternateContent xmlns:mc="http://schemas.openxmlformats.org/markup-compatibility/2006" xmlns:p14="http://schemas.microsoft.com/office/powerpoint/2010/main">
+    <mc:Choice Requires="p14">
       <p:transition spd="slow" p14:dur="800">
         <p14:flythrough/>
       </p:transition>
     </mc:Choice>
-    <mc:Fallback>
+    <mc:Fallback xmlns="">
       <p:transition spd="slow">
         <p:fade/>
       </p:transition>
@@ -2980,7 +2980,7 @@
           <a:p>
             <a:fld id="{065F3140-87E1-4878-A2FB-1306ED21F06D}" type="datetimeFigureOut">
               <a:rPr lang="fr-FR" smtClean="0"/>
-              <a:t>05/02/2018</a:t>
+              <a:t>07/02/2018</a:t>
             </a:fld>
             <a:endParaRPr lang="fr-FR" dirty="0"/>
           </a:p>
@@ -3120,13 +3120,13 @@
   <p:clrMapOvr>
     <a:masterClrMapping/>
   </p:clrMapOvr>
-  <mc:AlternateContent xmlns:mc="http://schemas.openxmlformats.org/markup-compatibility/2006">
-    <mc:Choice xmlns:p14="http://schemas.microsoft.com/office/powerpoint/2010/main" Requires="p14">
+  <mc:AlternateContent xmlns:mc="http://schemas.openxmlformats.org/markup-compatibility/2006" xmlns:p14="http://schemas.microsoft.com/office/powerpoint/2010/main">
+    <mc:Choice Requires="p14">
       <p:transition spd="slow" p14:dur="800">
         <p14:flythrough/>
       </p:transition>
     </mc:Choice>
-    <mc:Fallback>
+    <mc:Fallback xmlns="">
       <p:transition spd="slow">
         <p:fade/>
       </p:transition>
@@ -3321,7 +3321,7 @@
           <a:p>
             <a:fld id="{065F3140-87E1-4878-A2FB-1306ED21F06D}" type="datetimeFigureOut">
               <a:rPr lang="fr-FR" smtClean="0"/>
-              <a:t>05/02/2018</a:t>
+              <a:t>07/02/2018</a:t>
             </a:fld>
             <a:endParaRPr lang="fr-FR" dirty="0"/>
           </a:p>
@@ -3466,13 +3466,13 @@
   <p:clrMapOvr>
     <a:masterClrMapping/>
   </p:clrMapOvr>
-  <mc:AlternateContent xmlns:mc="http://schemas.openxmlformats.org/markup-compatibility/2006">
-    <mc:Choice xmlns:p14="http://schemas.microsoft.com/office/powerpoint/2010/main" Requires="p14">
+  <mc:AlternateContent xmlns:mc="http://schemas.openxmlformats.org/markup-compatibility/2006" xmlns:p14="http://schemas.microsoft.com/office/powerpoint/2010/main">
+    <mc:Choice Requires="p14">
       <p:transition spd="slow" p14:dur="800">
         <p14:flythrough/>
       </p:transition>
     </mc:Choice>
-    <mc:Fallback>
+    <mc:Fallback xmlns="">
       <p:transition spd="slow">
         <p:fade/>
       </p:transition>
@@ -3656,7 +3656,7 @@
           <a:p>
             <a:fld id="{065F3140-87E1-4878-A2FB-1306ED21F06D}" type="datetimeFigureOut">
               <a:rPr lang="fr-FR" smtClean="0"/>
-              <a:t>05/02/2018</a:t>
+              <a:t>07/02/2018</a:t>
             </a:fld>
             <a:endParaRPr lang="fr-FR" dirty="0"/>
           </a:p>
@@ -3801,13 +3801,13 @@
   <p:clrMapOvr>
     <a:masterClrMapping/>
   </p:clrMapOvr>
-  <mc:AlternateContent xmlns:mc="http://schemas.openxmlformats.org/markup-compatibility/2006">
-    <mc:Choice xmlns:p14="http://schemas.microsoft.com/office/powerpoint/2010/main" Requires="p14">
+  <mc:AlternateContent xmlns:mc="http://schemas.openxmlformats.org/markup-compatibility/2006" xmlns:p14="http://schemas.microsoft.com/office/powerpoint/2010/main">
+    <mc:Choice Requires="p14">
       <p:transition spd="slow" p14:dur="800">
         <p14:flythrough/>
       </p:transition>
     </mc:Choice>
-    <mc:Fallback>
+    <mc:Fallback xmlns="">
       <p:transition spd="slow">
         <p:fade/>
       </p:transition>
@@ -4130,7 +4130,7 @@
           <a:p>
             <a:fld id="{065F3140-87E1-4878-A2FB-1306ED21F06D}" type="datetimeFigureOut">
               <a:rPr lang="fr-FR" smtClean="0"/>
-              <a:t>05/02/2018</a:t>
+              <a:t>07/02/2018</a:t>
             </a:fld>
             <a:endParaRPr lang="fr-FR" dirty="0"/>
           </a:p>
@@ -4275,13 +4275,13 @@
   <p:clrMapOvr>
     <a:masterClrMapping/>
   </p:clrMapOvr>
-  <mc:AlternateContent xmlns:mc="http://schemas.openxmlformats.org/markup-compatibility/2006">
-    <mc:Choice xmlns:p14="http://schemas.microsoft.com/office/powerpoint/2010/main" Requires="p14">
+  <mc:AlternateContent xmlns:mc="http://schemas.openxmlformats.org/markup-compatibility/2006" xmlns:p14="http://schemas.microsoft.com/office/powerpoint/2010/main">
+    <mc:Choice Requires="p14">
       <p:transition spd="slow" p14:dur="800">
         <p14:flythrough/>
       </p:transition>
     </mc:Choice>
-    <mc:Fallback>
+    <mc:Fallback xmlns="">
       <p:transition spd="slow">
         <p:fade/>
       </p:transition>
@@ -4352,7 +4352,7 @@
           <a:p>
             <a:fld id="{065F3140-87E1-4878-A2FB-1306ED21F06D}" type="datetimeFigureOut">
               <a:rPr lang="fr-FR" smtClean="0"/>
-              <a:t>05/02/2018</a:t>
+              <a:t>07/02/2018</a:t>
             </a:fld>
             <a:endParaRPr lang="fr-FR" dirty="0"/>
           </a:p>
@@ -4492,13 +4492,13 @@
   <p:clrMapOvr>
     <a:masterClrMapping/>
   </p:clrMapOvr>
-  <mc:AlternateContent xmlns:mc="http://schemas.openxmlformats.org/markup-compatibility/2006">
-    <mc:Choice xmlns:p14="http://schemas.microsoft.com/office/powerpoint/2010/main" Requires="p14">
+  <mc:AlternateContent xmlns:mc="http://schemas.openxmlformats.org/markup-compatibility/2006" xmlns:p14="http://schemas.microsoft.com/office/powerpoint/2010/main">
+    <mc:Choice Requires="p14">
       <p:transition spd="slow" p14:dur="800">
         <p14:flythrough/>
       </p:transition>
     </mc:Choice>
-    <mc:Fallback>
+    <mc:Fallback xmlns="">
       <p:transition spd="slow">
         <p:fade/>
       </p:transition>
@@ -4541,7 +4541,7 @@
           <a:p>
             <a:fld id="{065F3140-87E1-4878-A2FB-1306ED21F06D}" type="datetimeFigureOut">
               <a:rPr lang="fr-FR" smtClean="0"/>
-              <a:t>05/02/2018</a:t>
+              <a:t>07/02/2018</a:t>
             </a:fld>
             <a:endParaRPr lang="fr-FR" dirty="0"/>
           </a:p>
@@ -4681,13 +4681,13 @@
   <p:clrMapOvr>
     <a:masterClrMapping/>
   </p:clrMapOvr>
-  <mc:AlternateContent xmlns:mc="http://schemas.openxmlformats.org/markup-compatibility/2006">
-    <mc:Choice xmlns:p14="http://schemas.microsoft.com/office/powerpoint/2010/main" Requires="p14">
+  <mc:AlternateContent xmlns:mc="http://schemas.openxmlformats.org/markup-compatibility/2006" xmlns:p14="http://schemas.microsoft.com/office/powerpoint/2010/main">
+    <mc:Choice Requires="p14">
       <p:transition spd="slow" p14:dur="800">
         <p14:flythrough/>
       </p:transition>
     </mc:Choice>
-    <mc:Fallback>
+    <mc:Fallback xmlns="">
       <p:transition spd="slow">
         <p:fade/>
       </p:transition>
@@ -4886,7 +4886,7 @@
           <a:p>
             <a:fld id="{065F3140-87E1-4878-A2FB-1306ED21F06D}" type="datetimeFigureOut">
               <a:rPr lang="fr-FR" smtClean="0"/>
-              <a:t>05/02/2018</a:t>
+              <a:t>07/02/2018</a:t>
             </a:fld>
             <a:endParaRPr lang="fr-FR" dirty="0"/>
           </a:p>
@@ -5026,13 +5026,13 @@
   <p:clrMapOvr>
     <a:masterClrMapping/>
   </p:clrMapOvr>
-  <mc:AlternateContent xmlns:mc="http://schemas.openxmlformats.org/markup-compatibility/2006">
-    <mc:Choice xmlns:p14="http://schemas.microsoft.com/office/powerpoint/2010/main" Requires="p14">
+  <mc:AlternateContent xmlns:mc="http://schemas.openxmlformats.org/markup-compatibility/2006" xmlns:p14="http://schemas.microsoft.com/office/powerpoint/2010/main">
+    <mc:Choice Requires="p14">
       <p:transition spd="slow" p14:dur="800">
         <p14:flythrough/>
       </p:transition>
     </mc:Choice>
-    <mc:Fallback>
+    <mc:Fallback xmlns="">
       <p:transition spd="slow">
         <p:fade/>
       </p:transition>
@@ -5248,7 +5248,7 @@
           <a:p>
             <a:fld id="{065F3140-87E1-4878-A2FB-1306ED21F06D}" type="datetimeFigureOut">
               <a:rPr lang="fr-FR" smtClean="0"/>
-              <a:t>05/02/2018</a:t>
+              <a:t>07/02/2018</a:t>
             </a:fld>
             <a:endParaRPr lang="fr-FR" dirty="0"/>
           </a:p>
@@ -5393,13 +5393,13 @@
   <p:clrMapOvr>
     <a:masterClrMapping/>
   </p:clrMapOvr>
-  <mc:AlternateContent xmlns:mc="http://schemas.openxmlformats.org/markup-compatibility/2006">
-    <mc:Choice xmlns:p14="http://schemas.microsoft.com/office/powerpoint/2010/main" Requires="p14">
+  <mc:AlternateContent xmlns:mc="http://schemas.openxmlformats.org/markup-compatibility/2006" xmlns:p14="http://schemas.microsoft.com/office/powerpoint/2010/main">
+    <mc:Choice Requires="p14">
       <p:transition spd="slow" p14:dur="800">
         <p14:flythrough/>
       </p:transition>
     </mc:Choice>
-    <mc:Fallback>
+    <mc:Fallback xmlns="">
       <p:transition spd="slow">
         <p:fade/>
       </p:transition>
@@ -7377,7 +7377,7 @@
           <a:p>
             <a:fld id="{065F3140-87E1-4878-A2FB-1306ED21F06D}" type="datetimeFigureOut">
               <a:rPr lang="fr-FR" smtClean="0"/>
-              <a:t>05/02/2018</a:t>
+              <a:t>07/02/2018</a:t>
             </a:fld>
             <a:endParaRPr lang="fr-FR" dirty="0"/>
           </a:p>
@@ -7485,13 +7485,13 @@
     <p:sldLayoutId id="2147484002" r:id="rId15"/>
     <p:sldLayoutId id="2147484003" r:id="rId16"/>
   </p:sldLayoutIdLst>
-  <mc:AlternateContent xmlns:mc="http://schemas.openxmlformats.org/markup-compatibility/2006">
-    <mc:Choice xmlns:p14="http://schemas.microsoft.com/office/powerpoint/2010/main" Requires="p14">
+  <mc:AlternateContent xmlns:mc="http://schemas.openxmlformats.org/markup-compatibility/2006" xmlns:p14="http://schemas.microsoft.com/office/powerpoint/2010/main">
+    <mc:Choice Requires="p14">
       <p:transition spd="slow" p14:dur="800">
         <p14:flythrough/>
       </p:transition>
     </mc:Choice>
-    <mc:Fallback>
+    <mc:Fallback xmlns="">
       <p:transition spd="slow">
         <p:fade/>
       </p:transition>
@@ -7993,13 +7993,13 @@
   <p:clrMapOvr>
     <a:masterClrMapping/>
   </p:clrMapOvr>
-  <mc:AlternateContent xmlns:mc="http://schemas.openxmlformats.org/markup-compatibility/2006">
-    <mc:Choice xmlns:p14="http://schemas.microsoft.com/office/powerpoint/2010/main" Requires="p14">
+  <mc:AlternateContent xmlns:mc="http://schemas.openxmlformats.org/markup-compatibility/2006" xmlns:p14="http://schemas.microsoft.com/office/powerpoint/2010/main">
+    <mc:Choice Requires="p14">
       <p:transition spd="slow" p14:dur="800">
         <p14:flythrough/>
       </p:transition>
     </mc:Choice>
-    <mc:Fallback>
+    <mc:Fallback xmlns="">
       <p:transition spd="slow">
         <p:fade/>
       </p:transition>
@@ -8684,13 +8684,13 @@
   <p:clrMapOvr>
     <a:masterClrMapping/>
   </p:clrMapOvr>
-  <mc:AlternateContent xmlns:mc="http://schemas.openxmlformats.org/markup-compatibility/2006">
-    <mc:Choice xmlns:p14="http://schemas.microsoft.com/office/powerpoint/2010/main" Requires="p14">
+  <mc:AlternateContent xmlns:mc="http://schemas.openxmlformats.org/markup-compatibility/2006" xmlns:p14="http://schemas.microsoft.com/office/powerpoint/2010/main">
+    <mc:Choice Requires="p14">
       <p:transition spd="slow" p14:dur="800">
         <p14:flythrough/>
       </p:transition>
     </mc:Choice>
-    <mc:Fallback>
+    <mc:Fallback xmlns="">
       <p:transition spd="slow">
         <p:fade/>
       </p:transition>
@@ -9004,13 +9004,13 @@
   <p:clrMapOvr>
     <a:masterClrMapping/>
   </p:clrMapOvr>
-  <mc:AlternateContent xmlns:mc="http://schemas.openxmlformats.org/markup-compatibility/2006">
-    <mc:Choice xmlns:p14="http://schemas.microsoft.com/office/powerpoint/2010/main" Requires="p14">
+  <mc:AlternateContent xmlns:mc="http://schemas.openxmlformats.org/markup-compatibility/2006" xmlns:p14="http://schemas.microsoft.com/office/powerpoint/2010/main">
+    <mc:Choice Requires="p14">
       <p:transition spd="slow" p14:dur="800">
         <p14:flythrough/>
       </p:transition>
     </mc:Choice>
-    <mc:Fallback>
+    <mc:Fallback xmlns="">
       <p:transition spd="slow">
         <p:fade/>
       </p:transition>
@@ -9531,13 +9531,13 @@
   <p:clrMapOvr>
     <a:masterClrMapping/>
   </p:clrMapOvr>
-  <mc:AlternateContent xmlns:mc="http://schemas.openxmlformats.org/markup-compatibility/2006">
-    <mc:Choice xmlns:p14="http://schemas.microsoft.com/office/powerpoint/2010/main" Requires="p14">
+  <mc:AlternateContent xmlns:mc="http://schemas.openxmlformats.org/markup-compatibility/2006" xmlns:p14="http://schemas.microsoft.com/office/powerpoint/2010/main">
+    <mc:Choice Requires="p14">
       <p:transition spd="slow" p14:dur="800">
         <p14:flythrough/>
       </p:transition>
     </mc:Choice>
-    <mc:Fallback>
+    <mc:Fallback xmlns="">
       <p:transition spd="slow">
         <p:fade/>
       </p:transition>
@@ -9684,13 +9684,13 @@
   <p:clrMapOvr>
     <a:masterClrMapping/>
   </p:clrMapOvr>
-  <mc:AlternateContent xmlns:mc="http://schemas.openxmlformats.org/markup-compatibility/2006">
-    <mc:Choice xmlns:p14="http://schemas.microsoft.com/office/powerpoint/2010/main" Requires="p14">
+  <mc:AlternateContent xmlns:mc="http://schemas.openxmlformats.org/markup-compatibility/2006" xmlns:p14="http://schemas.microsoft.com/office/powerpoint/2010/main">
+    <mc:Choice Requires="p14">
       <p:transition spd="slow" p14:dur="800">
         <p14:flythrough/>
       </p:transition>
     </mc:Choice>
-    <mc:Fallback>
+    <mc:Fallback xmlns="">
       <p:transition spd="slow">
         <p:fade/>
       </p:transition>
@@ -9803,13 +9803,13 @@
   <p:clrMapOvr>
     <a:masterClrMapping/>
   </p:clrMapOvr>
-  <mc:AlternateContent xmlns:mc="http://schemas.openxmlformats.org/markup-compatibility/2006">
-    <mc:Choice xmlns:p14="http://schemas.microsoft.com/office/powerpoint/2010/main" Requires="p14">
+  <mc:AlternateContent xmlns:mc="http://schemas.openxmlformats.org/markup-compatibility/2006" xmlns:p14="http://schemas.microsoft.com/office/powerpoint/2010/main">
+    <mc:Choice Requires="p14">
       <p:transition spd="slow" p14:dur="800">
         <p14:flythrough/>
       </p:transition>
     </mc:Choice>
-    <mc:Fallback>
+    <mc:Fallback xmlns="">
       <p:transition spd="slow">
         <p:fade/>
       </p:transition>
@@ -9890,7 +9890,7 @@
         <p:spPr>
           <a:xfrm>
             <a:off x="2557463" y="1506874"/>
-            <a:ext cx="10291761" cy="4049916"/>
+            <a:ext cx="10291761" cy="4710468"/>
           </a:xfrm>
         </p:spPr>
         <p:txBody>
@@ -9993,6 +9993,19 @@
               </a:rPr>
               <a:t>Une batterie externe 5000mAh pour une utilisation toute la journée</a:t>
             </a:r>
+          </a:p>
+          <a:p>
+            <a:r>
+              <a:rPr lang="fr-FR">
+                <a:latin typeface="Franklin Gothic Medium" panose="020B0603020102020204" pitchFamily="34" charset="0"/>
+                <a:cs typeface="Arial" panose="020B0604020202020204" pitchFamily="34" charset="0"/>
+              </a:rPr>
+              <a:t>Une mini breadBoard</a:t>
+            </a:r>
+            <a:endParaRPr lang="fr-FR" dirty="0">
+              <a:latin typeface="Franklin Gothic Medium" panose="020B0603020102020204" pitchFamily="34" charset="0"/>
+              <a:cs typeface="Arial" panose="020B0604020202020204" pitchFamily="34" charset="0"/>
+            </a:endParaRPr>
           </a:p>
         </p:txBody>
       </p:sp>
@@ -10006,13 +10019,13 @@
   <p:clrMapOvr>
     <a:masterClrMapping/>
   </p:clrMapOvr>
-  <mc:AlternateContent xmlns:mc="http://schemas.openxmlformats.org/markup-compatibility/2006">
-    <mc:Choice xmlns:p14="http://schemas.microsoft.com/office/powerpoint/2010/main" Requires="p14">
+  <mc:AlternateContent xmlns:mc="http://schemas.openxmlformats.org/markup-compatibility/2006" xmlns:p14="http://schemas.microsoft.com/office/powerpoint/2010/main">
+    <mc:Choice Requires="p14">
       <p:transition spd="slow" p14:dur="800">
         <p14:flythrough/>
       </p:transition>
     </mc:Choice>
-    <mc:Fallback>
+    <mc:Fallback xmlns="">
       <p:transition spd="slow">
         <p:fade/>
       </p:transition>
@@ -10233,13 +10246,13 @@
   <p:clrMapOvr>
     <a:masterClrMapping/>
   </p:clrMapOvr>
-  <mc:AlternateContent xmlns:mc="http://schemas.openxmlformats.org/markup-compatibility/2006">
-    <mc:Choice xmlns:p14="http://schemas.microsoft.com/office/powerpoint/2010/main" Requires="p14">
+  <mc:AlternateContent xmlns:mc="http://schemas.openxmlformats.org/markup-compatibility/2006" xmlns:p14="http://schemas.microsoft.com/office/powerpoint/2010/main">
+    <mc:Choice Requires="p14">
       <p:transition spd="slow" p14:dur="800">
         <p14:flythrough/>
       </p:transition>
     </mc:Choice>
-    <mc:Fallback>
+    <mc:Fallback xmlns="">
       <p:transition spd="slow">
         <p:fade/>
       </p:transition>
@@ -10493,13 +10506,13 @@
   <p:clrMapOvr>
     <a:masterClrMapping/>
   </p:clrMapOvr>
-  <mc:AlternateContent xmlns:mc="http://schemas.openxmlformats.org/markup-compatibility/2006">
-    <mc:Choice xmlns:p14="http://schemas.microsoft.com/office/powerpoint/2010/main" Requires="p14">
+  <mc:AlternateContent xmlns:mc="http://schemas.openxmlformats.org/markup-compatibility/2006" xmlns:p14="http://schemas.microsoft.com/office/powerpoint/2010/main">
+    <mc:Choice Requires="p14">
       <p:transition spd="slow" p14:dur="800">
         <p14:flythrough/>
       </p:transition>
     </mc:Choice>
-    <mc:Fallback>
+    <mc:Fallback xmlns="">
       <p:transition spd="slow">
         <p:fade/>
       </p:transition>
@@ -10637,13 +10650,13 @@
   <p:clrMapOvr>
     <a:masterClrMapping/>
   </p:clrMapOvr>
-  <mc:AlternateContent xmlns:mc="http://schemas.openxmlformats.org/markup-compatibility/2006">
-    <mc:Choice xmlns:p14="http://schemas.microsoft.com/office/powerpoint/2010/main" Requires="p14">
+  <mc:AlternateContent xmlns:mc="http://schemas.openxmlformats.org/markup-compatibility/2006" xmlns:p14="http://schemas.microsoft.com/office/powerpoint/2010/main">
+    <mc:Choice Requires="p14">
       <p:transition spd="slow" p14:dur="800">
         <p14:flythrough/>
       </p:transition>
     </mc:Choice>
-    <mc:Fallback>
+    <mc:Fallback xmlns="">
       <p:transition spd="slow">
         <p:fade/>
       </p:transition>
@@ -10814,13 +10827,13 @@
   <p:clrMapOvr>
     <a:masterClrMapping/>
   </p:clrMapOvr>
-  <mc:AlternateContent xmlns:mc="http://schemas.openxmlformats.org/markup-compatibility/2006">
-    <mc:Choice xmlns:p14="http://schemas.microsoft.com/office/powerpoint/2010/main" Requires="p14">
+  <mc:AlternateContent xmlns:mc="http://schemas.openxmlformats.org/markup-compatibility/2006" xmlns:p14="http://schemas.microsoft.com/office/powerpoint/2010/main">
+    <mc:Choice Requires="p14">
       <p:transition spd="slow" p14:dur="800">
         <p14:flythrough/>
       </p:transition>
     </mc:Choice>
-    <mc:Fallback>
+    <mc:Fallback xmlns="">
       <p:transition spd="slow">
         <p:fade/>
       </p:transition>
@@ -11057,13 +11070,13 @@
   <p:clrMapOvr>
     <a:masterClrMapping/>
   </p:clrMapOvr>
-  <mc:AlternateContent xmlns:mc="http://schemas.openxmlformats.org/markup-compatibility/2006">
-    <mc:Choice xmlns:p14="http://schemas.microsoft.com/office/powerpoint/2010/main" Requires="p14">
+  <mc:AlternateContent xmlns:mc="http://schemas.openxmlformats.org/markup-compatibility/2006" xmlns:p14="http://schemas.microsoft.com/office/powerpoint/2010/main">
+    <mc:Choice Requires="p14">
       <p:transition spd="slow" p14:dur="800">
         <p14:flythrough/>
       </p:transition>
     </mc:Choice>
-    <mc:Fallback>
+    <mc:Fallback xmlns="">
       <p:transition spd="slow">
         <p:fade/>
       </p:transition>
@@ -11329,13 +11342,13 @@
   <p:clrMapOvr>
     <a:masterClrMapping/>
   </p:clrMapOvr>
-  <mc:AlternateContent xmlns:mc="http://schemas.openxmlformats.org/markup-compatibility/2006">
-    <mc:Choice xmlns:p14="http://schemas.microsoft.com/office/powerpoint/2010/main" Requires="p14">
+  <mc:AlternateContent xmlns:mc="http://schemas.openxmlformats.org/markup-compatibility/2006" xmlns:p14="http://schemas.microsoft.com/office/powerpoint/2010/main">
+    <mc:Choice Requires="p14">
       <p:transition spd="slow" p14:dur="800">
         <p14:flythrough/>
       </p:transition>
     </mc:Choice>
-    <mc:Fallback>
+    <mc:Fallback xmlns="">
       <p:transition spd="slow">
         <p:fade/>
       </p:transition>

</xml_diff>

<commit_message>
Modification de la documentation et du cours
</commit_message>
<xml_diff>
--- a/cours/Irondelle.pptx
+++ b/cours/Irondelle.pptx
@@ -17,7 +17,8 @@
     <p:sldId id="264" r:id="rId11"/>
     <p:sldId id="267" r:id="rId12"/>
     <p:sldId id="268" r:id="rId13"/>
-    <p:sldId id="265" r:id="rId14"/>
+    <p:sldId id="269" r:id="rId14"/>
+    <p:sldId id="265" r:id="rId15"/>
   </p:sldIdLst>
   <p:sldSz cx="12192000" cy="6858000"/>
   <p:notesSz cx="6858000" cy="9144000"/>
@@ -312,7 +313,7 @@
           <a:p>
             <a:fld id="{065F3140-87E1-4878-A2FB-1306ED21F06D}" type="datetimeFigureOut">
               <a:rPr lang="fr-FR" smtClean="0"/>
-              <a:t>07/02/2018</a:t>
+              <a:t>16/02/2018</a:t>
             </a:fld>
             <a:endParaRPr lang="fr-FR" dirty="0"/>
           </a:p>
@@ -662,7 +663,7 @@
           <a:p>
             <a:fld id="{065F3140-87E1-4878-A2FB-1306ED21F06D}" type="datetimeFigureOut">
               <a:rPr lang="fr-FR" smtClean="0"/>
-              <a:t>07/02/2018</a:t>
+              <a:t>16/02/2018</a:t>
             </a:fld>
             <a:endParaRPr lang="fr-FR" dirty="0"/>
           </a:p>
@@ -1075,7 +1076,7 @@
           <a:p>
             <a:fld id="{065F3140-87E1-4878-A2FB-1306ED21F06D}" type="datetimeFigureOut">
               <a:rPr lang="fr-FR" smtClean="0"/>
-              <a:t>07/02/2018</a:t>
+              <a:t>16/02/2018</a:t>
             </a:fld>
             <a:endParaRPr lang="fr-FR" dirty="0"/>
           </a:p>
@@ -1423,7 +1424,7 @@
           <a:p>
             <a:fld id="{065F3140-87E1-4878-A2FB-1306ED21F06D}" type="datetimeFigureOut">
               <a:rPr lang="fr-FR" smtClean="0"/>
-              <a:t>07/02/2018</a:t>
+              <a:t>16/02/2018</a:t>
             </a:fld>
             <a:endParaRPr lang="fr-FR" dirty="0"/>
           </a:p>
@@ -1755,7 +1756,7 @@
           <a:p>
             <a:fld id="{065F3140-87E1-4878-A2FB-1306ED21F06D}" type="datetimeFigureOut">
               <a:rPr lang="fr-FR" smtClean="0"/>
-              <a:t>07/02/2018</a:t>
+              <a:t>16/02/2018</a:t>
             </a:fld>
             <a:endParaRPr lang="fr-FR" dirty="0"/>
           </a:p>
@@ -2163,7 +2164,7 @@
           <a:p>
             <a:fld id="{065F3140-87E1-4878-A2FB-1306ED21F06D}" type="datetimeFigureOut">
               <a:rPr lang="fr-FR" smtClean="0"/>
-              <a:t>07/02/2018</a:t>
+              <a:t>16/02/2018</a:t>
             </a:fld>
             <a:endParaRPr lang="fr-FR" dirty="0"/>
           </a:p>
@@ -2432,7 +2433,7 @@
           <a:p>
             <a:fld id="{065F3140-87E1-4878-A2FB-1306ED21F06D}" type="datetimeFigureOut">
               <a:rPr lang="fr-FR" smtClean="0"/>
-              <a:t>07/02/2018</a:t>
+              <a:t>16/02/2018</a:t>
             </a:fld>
             <a:endParaRPr lang="fr-FR" dirty="0"/>
           </a:p>
@@ -2706,7 +2707,7 @@
           <a:p>
             <a:fld id="{065F3140-87E1-4878-A2FB-1306ED21F06D}" type="datetimeFigureOut">
               <a:rPr lang="fr-FR" smtClean="0"/>
-              <a:t>07/02/2018</a:t>
+              <a:t>16/02/2018</a:t>
             </a:fld>
             <a:endParaRPr lang="fr-FR" dirty="0"/>
           </a:p>
@@ -2980,7 +2981,7 @@
           <a:p>
             <a:fld id="{065F3140-87E1-4878-A2FB-1306ED21F06D}" type="datetimeFigureOut">
               <a:rPr lang="fr-FR" smtClean="0"/>
-              <a:t>07/02/2018</a:t>
+              <a:t>16/02/2018</a:t>
             </a:fld>
             <a:endParaRPr lang="fr-FR" dirty="0"/>
           </a:p>
@@ -3321,7 +3322,7 @@
           <a:p>
             <a:fld id="{065F3140-87E1-4878-A2FB-1306ED21F06D}" type="datetimeFigureOut">
               <a:rPr lang="fr-FR" smtClean="0"/>
-              <a:t>07/02/2018</a:t>
+              <a:t>16/02/2018</a:t>
             </a:fld>
             <a:endParaRPr lang="fr-FR" dirty="0"/>
           </a:p>
@@ -3656,7 +3657,7 @@
           <a:p>
             <a:fld id="{065F3140-87E1-4878-A2FB-1306ED21F06D}" type="datetimeFigureOut">
               <a:rPr lang="fr-FR" smtClean="0"/>
-              <a:t>07/02/2018</a:t>
+              <a:t>16/02/2018</a:t>
             </a:fld>
             <a:endParaRPr lang="fr-FR" dirty="0"/>
           </a:p>
@@ -4130,7 +4131,7 @@
           <a:p>
             <a:fld id="{065F3140-87E1-4878-A2FB-1306ED21F06D}" type="datetimeFigureOut">
               <a:rPr lang="fr-FR" smtClean="0"/>
-              <a:t>07/02/2018</a:t>
+              <a:t>16/02/2018</a:t>
             </a:fld>
             <a:endParaRPr lang="fr-FR" dirty="0"/>
           </a:p>
@@ -4352,7 +4353,7 @@
           <a:p>
             <a:fld id="{065F3140-87E1-4878-A2FB-1306ED21F06D}" type="datetimeFigureOut">
               <a:rPr lang="fr-FR" smtClean="0"/>
-              <a:t>07/02/2018</a:t>
+              <a:t>16/02/2018</a:t>
             </a:fld>
             <a:endParaRPr lang="fr-FR" dirty="0"/>
           </a:p>
@@ -4541,7 +4542,7 @@
           <a:p>
             <a:fld id="{065F3140-87E1-4878-A2FB-1306ED21F06D}" type="datetimeFigureOut">
               <a:rPr lang="fr-FR" smtClean="0"/>
-              <a:t>07/02/2018</a:t>
+              <a:t>16/02/2018</a:t>
             </a:fld>
             <a:endParaRPr lang="fr-FR" dirty="0"/>
           </a:p>
@@ -4886,7 +4887,7 @@
           <a:p>
             <a:fld id="{065F3140-87E1-4878-A2FB-1306ED21F06D}" type="datetimeFigureOut">
               <a:rPr lang="fr-FR" smtClean="0"/>
-              <a:t>07/02/2018</a:t>
+              <a:t>16/02/2018</a:t>
             </a:fld>
             <a:endParaRPr lang="fr-FR" dirty="0"/>
           </a:p>
@@ -5248,7 +5249,7 @@
           <a:p>
             <a:fld id="{065F3140-87E1-4878-A2FB-1306ED21F06D}" type="datetimeFigureOut">
               <a:rPr lang="fr-FR" smtClean="0"/>
-              <a:t>07/02/2018</a:t>
+              <a:t>16/02/2018</a:t>
             </a:fld>
             <a:endParaRPr lang="fr-FR" dirty="0"/>
           </a:p>
@@ -7377,7 +7378,7 @@
           <a:p>
             <a:fld id="{065F3140-87E1-4878-A2FB-1306ED21F06D}" type="datetimeFigureOut">
               <a:rPr lang="fr-FR" smtClean="0"/>
-              <a:t>07/02/2018</a:t>
+              <a:t>16/02/2018</a:t>
             </a:fld>
             <a:endParaRPr lang="fr-FR" dirty="0"/>
           </a:p>
@@ -7930,7 +7931,7 @@
         </p:nvSpPr>
         <p:spPr>
           <a:xfrm>
-            <a:off x="2577663" y="1000051"/>
+            <a:off x="2112921" y="1079565"/>
             <a:ext cx="10318418" cy="4394988"/>
           </a:xfrm>
         </p:spPr>
@@ -7975,8 +7976,8 @@
         </p:blipFill>
         <p:spPr>
           <a:xfrm>
-            <a:off x="5562600" y="1223087"/>
-            <a:ext cx="6858000" cy="6858000"/>
+            <a:off x="7272130" y="2441713"/>
+            <a:ext cx="4416287" cy="4416287"/>
           </a:xfrm>
           <a:prstGeom prst="rect">
             <a:avLst/>
@@ -8043,7 +8044,7 @@
         </p:nvSpPr>
         <p:spPr>
           <a:xfrm>
-            <a:off x="1623668" y="650507"/>
+            <a:off x="1583913" y="637254"/>
             <a:ext cx="10396882" cy="1158140"/>
           </a:xfrm>
         </p:spPr>
@@ -8053,8 +8054,13 @@
           <a:p>
             <a:r>
               <a:rPr lang="fr-FR" dirty="0"/>
-              <a:t>Branchement et code Arduino</a:t>
-            </a:r>
+              <a:t>Exemple pour allumer une </a:t>
+            </a:r>
+            <a:r>
+              <a:rPr lang="fr-FR" dirty="0" err="1"/>
+              <a:t>led</a:t>
+            </a:r>
+            <a:endParaRPr lang="fr-FR" dirty="0"/>
           </a:p>
         </p:txBody>
       </p:sp>
@@ -8777,8 +8783,8 @@
         </p:nvSpPr>
         <p:spPr>
           <a:xfrm>
-            <a:off x="2093844" y="1739126"/>
-            <a:ext cx="3511545" cy="3940844"/>
+            <a:off x="2093844" y="1739125"/>
+            <a:ext cx="8680173" cy="4886961"/>
           </a:xfrm>
         </p:spPr>
         <p:txBody>
@@ -8788,212 +8794,79 @@
           <a:lstStyle/>
           <a:p>
             <a:r>
-              <a:rPr lang="en-US" dirty="0"/>
-              <a:t>Pour </a:t>
-            </a:r>
-            <a:r>
               <a:rPr lang="fr-FR" dirty="0"/>
-              <a:t>communiquer</a:t>
-            </a:r>
-            <a:r>
-              <a:rPr lang="en-US" dirty="0"/>
-              <a:t> entre </a:t>
+              <a:t>Pour communiquer entre ces deux appareils il suffit de les connecter en </a:t>
+            </a:r>
+            <a:r>
+              <a:rPr lang="fr-FR" dirty="0" err="1"/>
+              <a:t>bluetooth</a:t>
             </a:r>
             <a:r>
               <a:rPr lang="fr-FR" dirty="0"/>
-              <a:t>ces</a:t>
-            </a:r>
-            <a:r>
-              <a:rPr lang="en-US" dirty="0"/>
+              <a:t> (il faut un </a:t>
+            </a:r>
+            <a:r>
+              <a:rPr lang="fr-FR" dirty="0" err="1"/>
+              <a:t>shield</a:t>
+            </a:r>
+            <a:r>
+              <a:rPr lang="fr-FR" dirty="0"/>
               <a:t> </a:t>
             </a:r>
             <a:r>
-              <a:rPr lang="en-US" dirty="0" err="1"/>
-              <a:t>deux</a:t>
-            </a:r>
-            <a:r>
-              <a:rPr lang="en-US" dirty="0"/>
-              <a:t> </a:t>
+              <a:rPr lang="fr-FR" dirty="0" err="1"/>
+              <a:t>bluetooth</a:t>
             </a:r>
             <a:r>
               <a:rPr lang="fr-FR" dirty="0"/>
-              <a:t>appareils</a:t>
-            </a:r>
-            <a:r>
-              <a:rPr lang="en-US" dirty="0"/>
-              <a:t> </a:t>
-            </a:r>
-            <a:r>
-              <a:rPr lang="en-US" dirty="0" err="1"/>
-              <a:t>il</a:t>
-            </a:r>
-            <a:r>
-              <a:rPr lang="en-US" dirty="0"/>
-              <a:t> </a:t>
-            </a:r>
-            <a:r>
-              <a:rPr lang="en-US" dirty="0" err="1"/>
-              <a:t>suffit</a:t>
-            </a:r>
-            <a:r>
-              <a:rPr lang="en-US" dirty="0"/>
-              <a:t> de les connecter </a:t>
-            </a:r>
-            <a:r>
-              <a:rPr lang="en-US" dirty="0" err="1"/>
-              <a:t>en</a:t>
-            </a:r>
-            <a:r>
-              <a:rPr lang="en-US" dirty="0"/>
-              <a:t> </a:t>
-            </a:r>
-            <a:r>
-              <a:rPr lang="en-US" dirty="0" err="1"/>
-              <a:t>bluetooth</a:t>
-            </a:r>
-            <a:r>
-              <a:rPr lang="en-US" dirty="0"/>
-              <a:t> (</a:t>
-            </a:r>
-            <a:r>
-              <a:rPr lang="en-US" dirty="0" err="1"/>
-              <a:t>il</a:t>
-            </a:r>
-            <a:r>
-              <a:rPr lang="en-US" dirty="0"/>
-              <a:t> </a:t>
-            </a:r>
-            <a:r>
-              <a:rPr lang="en-US" dirty="0" err="1"/>
-              <a:t>faut</a:t>
-            </a:r>
-            <a:r>
-              <a:rPr lang="en-US" dirty="0"/>
-              <a:t> un shield </a:t>
-            </a:r>
-            <a:r>
-              <a:rPr lang="en-US" dirty="0" err="1"/>
-              <a:t>bluetooth</a:t>
-            </a:r>
-            <a:r>
-              <a:rPr lang="en-US" dirty="0"/>
               <a:t> sur </a:t>
             </a:r>
             <a:r>
-              <a:rPr lang="en-US" dirty="0" err="1"/>
+              <a:rPr lang="fr-FR" dirty="0" err="1"/>
               <a:t>l’arduino</a:t>
             </a:r>
             <a:r>
-              <a:rPr lang="en-US" dirty="0"/>
+              <a:rPr lang="fr-FR" dirty="0"/>
               <a:t>)</a:t>
             </a:r>
           </a:p>
           <a:p>
             <a:r>
-              <a:rPr lang="en-US" dirty="0"/>
-              <a:t>Installer </a:t>
-            </a:r>
-            <a:r>
-              <a:rPr lang="en-US" dirty="0" err="1"/>
-              <a:t>l’application</a:t>
-            </a:r>
-            <a:r>
-              <a:rPr lang="en-US" dirty="0"/>
-              <a:t>:</a:t>
+              <a:rPr lang="fr-FR" dirty="0"/>
+              <a:t>Nous avons choisi le Bluetooth du fait que les autres techniques requièrent d’être connecté à internet, de plus n’étant pas connecté nous respectons le RGPD</a:t>
+            </a:r>
+          </a:p>
+          <a:p>
+            <a:r>
+              <a:rPr lang="fr-FR" dirty="0"/>
+              <a:t>Si vous souhaitez vérifier techniquement que la communication Bluetooth fonctionne entre le téléphone et la télécommande vous pouvez installer cette application depuis le </a:t>
+            </a:r>
+            <a:r>
+              <a:rPr lang="fr-FR" dirty="0" err="1"/>
+              <a:t>play</a:t>
+            </a:r>
+            <a:r>
+              <a:rPr lang="fr-FR" dirty="0"/>
+              <a:t> store:</a:t>
             </a:r>
           </a:p>
           <a:p>
             <a:pPr lvl="1"/>
             <a:r>
-              <a:rPr lang="en-US" dirty="0"/>
+              <a:rPr lang="fr-FR" dirty="0"/>
               <a:t>Arduino Bluetooth Control</a:t>
             </a:r>
-          </a:p>
-          <a:p>
-            <a:r>
-              <a:rPr lang="en-US" dirty="0"/>
-              <a:t>Grace a </a:t>
-            </a:r>
-            <a:r>
-              <a:rPr lang="en-US" dirty="0" err="1"/>
-              <a:t>cette</a:t>
-            </a:r>
-            <a:r>
-              <a:rPr lang="en-US" dirty="0"/>
-              <a:t> application </a:t>
-            </a:r>
-            <a:r>
-              <a:rPr lang="en-US" dirty="0" err="1"/>
-              <a:t>vous</a:t>
-            </a:r>
-            <a:r>
-              <a:rPr lang="en-US" dirty="0"/>
-              <a:t> </a:t>
-            </a:r>
-            <a:r>
-              <a:rPr lang="en-US" dirty="0" err="1"/>
-              <a:t>pourrez</a:t>
-            </a:r>
-            <a:r>
-              <a:rPr lang="en-US" dirty="0"/>
-              <a:t> meme </a:t>
-            </a:r>
-            <a:r>
-              <a:rPr lang="en-US" dirty="0" err="1"/>
-              <a:t>communiquer</a:t>
-            </a:r>
-            <a:r>
-              <a:rPr lang="en-US" dirty="0"/>
-              <a:t> </a:t>
-            </a:r>
-            <a:r>
-              <a:rPr lang="en-US" dirty="0" err="1"/>
-              <a:t>en</a:t>
-            </a:r>
-            <a:r>
-              <a:rPr lang="en-US" dirty="0"/>
-              <a:t> vocal avec </a:t>
-            </a:r>
-            <a:r>
-              <a:rPr lang="en-US" dirty="0" err="1"/>
-              <a:t>l’arduino</a:t>
-            </a:r>
             <a:endParaRPr lang="en-US" dirty="0"/>
           </a:p>
-        </p:txBody>
-      </p:sp>
-      <p:pic>
-        <p:nvPicPr>
-          <p:cNvPr id="9" name="Espace réservé du contenu 8">
-            <a:extLst>
-              <a:ext uri="{FF2B5EF4-FFF2-40B4-BE49-F238E27FC236}">
-                <a16:creationId xmlns:a16="http://schemas.microsoft.com/office/drawing/2014/main" id="{54AE7C2A-5A1F-4E5F-B6FF-747822AB76EF}"/>
-              </a:ext>
-            </a:extLst>
-          </p:cNvPr>
-          <p:cNvPicPr>
-            <a:picLocks noGrp="1" noChangeAspect="1"/>
-          </p:cNvPicPr>
-          <p:nvPr>
-            <p:ph sz="half" idx="2"/>
-          </p:nvPr>
-        </p:nvPicPr>
-        <p:blipFill>
-          <a:blip r:embed="rId2"/>
-          <a:stretch>
-            <a:fillRect/>
-          </a:stretch>
-        </p:blipFill>
-        <p:spPr>
-          <a:xfrm>
-            <a:off x="6288015" y="1739126"/>
-            <a:ext cx="5730877" cy="3940844"/>
-          </a:xfrm>
-          <a:prstGeom prst="rect">
-            <a:avLst/>
-          </a:prstGeom>
-        </p:spPr>
-      </p:pic>
+          <a:p>
+            <a:pPr lvl="1"/>
+            <a:r>
+              <a:rPr lang="fr-FR" dirty="0"/>
+              <a:t>Une fois installé et le téléphone appairé les télécommandes apparaîtra dans l’application, il aura uniquement cliqué dessus et sélectionner terminal mode. Puis vous serez en communication avec la télécommande</a:t>
+            </a:r>
+          </a:p>
+        </p:txBody>
+      </p:sp>
     </p:spTree>
     <p:extLst>
       <p:ext uri="{BB962C8B-B14F-4D97-AF65-F5344CB8AC3E}">
@@ -9054,17 +8927,19 @@
         </p:nvSpPr>
         <p:spPr>
           <a:xfrm>
-            <a:off x="1781765" y="615911"/>
-            <a:ext cx="4314235" cy="855396"/>
+            <a:off x="1596235" y="595560"/>
+            <a:ext cx="5241887" cy="855396"/>
           </a:xfrm>
         </p:spPr>
         <p:txBody>
-          <a:bodyPr/>
+          <a:bodyPr>
+            <a:normAutofit fontScale="90000"/>
+          </a:bodyPr>
           <a:lstStyle/>
           <a:p>
             <a:r>
               <a:rPr lang="fr-FR" dirty="0"/>
-              <a:t>Code Arduino</a:t>
+              <a:t>Exemple de montage Bluetooth avec son code</a:t>
             </a:r>
           </a:p>
         </p:txBody>
@@ -9087,7 +8962,7 @@
         </p:nvSpPr>
         <p:spPr>
           <a:xfrm>
-            <a:off x="6586331" y="53009"/>
+            <a:off x="7095887" y="0"/>
             <a:ext cx="5096113" cy="6858000"/>
           </a:xfrm>
         </p:spPr>
@@ -9521,6 +9396,38 @@
           </a:p>
         </p:txBody>
       </p:sp>
+      <p:pic>
+        <p:nvPicPr>
+          <p:cNvPr id="4" name="Espace réservé du contenu 8">
+            <a:extLst>
+              <a:ext uri="{FF2B5EF4-FFF2-40B4-BE49-F238E27FC236}">
+                <a16:creationId xmlns:a16="http://schemas.microsoft.com/office/drawing/2014/main" id="{9E2BC1AC-1F84-479E-946C-1C7B6341DC2C}"/>
+              </a:ext>
+            </a:extLst>
+          </p:cNvPr>
+          <p:cNvPicPr>
+            <a:picLocks noGrp="1" noChangeAspect="1"/>
+          </p:cNvPicPr>
+          <p:nvPr>
+            <p:ph sz="half" idx="2"/>
+          </p:nvPr>
+        </p:nvPicPr>
+        <p:blipFill>
+          <a:blip r:embed="rId2"/>
+          <a:stretch>
+            <a:fillRect/>
+          </a:stretch>
+        </p:blipFill>
+        <p:spPr>
+          <a:xfrm>
+            <a:off x="509556" y="1748863"/>
+            <a:ext cx="5941791" cy="4085879"/>
+          </a:xfrm>
+          <a:prstGeom prst="rect">
+            <a:avLst/>
+          </a:prstGeom>
+        </p:spPr>
+      </p:pic>
     </p:spTree>
     <p:extLst>
       <p:ext uri="{BB962C8B-B14F-4D97-AF65-F5344CB8AC3E}">
@@ -9568,6 +9475,107 @@
           <p:cNvPr id="2" name="Titre 1">
             <a:extLst>
               <a:ext uri="{FF2B5EF4-FFF2-40B4-BE49-F238E27FC236}">
+                <a16:creationId xmlns:a16="http://schemas.microsoft.com/office/drawing/2014/main" id="{87286187-AA27-4FB0-90E6-F0055383252F}"/>
+              </a:ext>
+            </a:extLst>
+          </p:cNvPr>
+          <p:cNvSpPr>
+            <a:spLocks noGrp="1"/>
+          </p:cNvSpPr>
+          <p:nvPr>
+            <p:ph type="title"/>
+          </p:nvPr>
+        </p:nvSpPr>
+        <p:spPr>
+          <a:xfrm>
+            <a:off x="2146853" y="2239617"/>
+            <a:ext cx="9437272" cy="3117040"/>
+          </a:xfrm>
+        </p:spPr>
+        <p:txBody>
+          <a:bodyPr>
+            <a:normAutofit fontScale="90000"/>
+          </a:bodyPr>
+          <a:lstStyle/>
+          <a:p>
+            <a:pPr algn="ctr"/>
+            <a:r>
+              <a:rPr lang="fr-FR" dirty="0"/>
+              <a:t>Fin du montage du projet </a:t>
+            </a:r>
+            <a:r>
+              <a:rPr lang="fr-FR" dirty="0" err="1"/>
+              <a:t>Irondelle</a:t>
+            </a:r>
+            <a:br>
+              <a:rPr lang="fr-FR" dirty="0"/>
+            </a:br>
+            <a:r>
+              <a:rPr lang="fr-FR" dirty="0"/>
+              <a:t>Le projet </a:t>
+            </a:r>
+            <a:r>
+              <a:rPr lang="fr-FR" dirty="0" err="1"/>
+              <a:t>irondelle</a:t>
+            </a:r>
+            <a:r>
+              <a:rPr lang="fr-FR" dirty="0"/>
+              <a:t> est fonctionnel</a:t>
+            </a:r>
+            <a:br>
+              <a:rPr lang="fr-FR" dirty="0"/>
+            </a:br>
+            <a:endParaRPr lang="fr-FR" dirty="0"/>
+          </a:p>
+        </p:txBody>
+      </p:sp>
+    </p:spTree>
+    <p:extLst>
+      <p:ext uri="{BB962C8B-B14F-4D97-AF65-F5344CB8AC3E}">
+        <p14:creationId xmlns:p14="http://schemas.microsoft.com/office/powerpoint/2010/main" val="3102330008"/>
+      </p:ext>
+    </p:extLst>
+  </p:cSld>
+  <p:clrMapOvr>
+    <a:masterClrMapping/>
+  </p:clrMapOvr>
+  <mc:AlternateContent xmlns:mc="http://schemas.openxmlformats.org/markup-compatibility/2006" xmlns:p14="http://schemas.microsoft.com/office/powerpoint/2010/main">
+    <mc:Choice Requires="p14">
+      <p:transition spd="slow" p14:dur="800">
+        <p14:flythrough/>
+      </p:transition>
+    </mc:Choice>
+    <mc:Fallback xmlns="">
+      <p:transition spd="slow">
+        <p:fade/>
+      </p:transition>
+    </mc:Fallback>
+  </mc:AlternateContent>
+</p:sld>
+</file>
+
+<file path=ppt/slides/slide14.xml><?xml version="1.0" encoding="utf-8"?>
+<p:sld xmlns:a="http://schemas.openxmlformats.org/drawingml/2006/main" xmlns:r="http://schemas.openxmlformats.org/officeDocument/2006/relationships" xmlns:p="http://schemas.openxmlformats.org/presentationml/2006/main">
+  <p:cSld>
+    <p:spTree>
+      <p:nvGrpSpPr>
+        <p:cNvPr id="1" name=""/>
+        <p:cNvGrpSpPr/>
+        <p:nvPr/>
+      </p:nvGrpSpPr>
+      <p:grpSpPr>
+        <a:xfrm>
+          <a:off x="0" y="0"/>
+          <a:ext cx="0" cy="0"/>
+          <a:chOff x="0" y="0"/>
+          <a:chExt cx="0" cy="0"/>
+        </a:xfrm>
+      </p:grpSpPr>
+      <p:sp>
+        <p:nvSpPr>
+          <p:cNvPr id="2" name="Titre 1">
+            <a:extLst>
+              <a:ext uri="{FF2B5EF4-FFF2-40B4-BE49-F238E27FC236}">
                 <a16:creationId xmlns:a16="http://schemas.microsoft.com/office/drawing/2014/main" id="{285578D4-74D9-40BC-B92E-188C26AB6A36}"/>
               </a:ext>
             </a:extLst>
@@ -9773,7 +9781,7 @@
                 <a:latin typeface="Arial" panose="020B0604020202020204" pitchFamily="34" charset="0"/>
                 <a:cs typeface="Arial" panose="020B0604020202020204" pitchFamily="34" charset="0"/>
               </a:rPr>
-              <a:t>L’application a pour but d’aider les personnes porteuses d’un handicap physique. </a:t>
+              <a:t>L’application a pour but d’aider les personnes porteuses d’handicap et toutes celles en ayant l’utilité. </a:t>
             </a:r>
           </a:p>
           <a:p>
@@ -9782,7 +9790,7 @@
                 <a:latin typeface="Arial" panose="020B0604020202020204" pitchFamily="34" charset="0"/>
                 <a:cs typeface="Arial" panose="020B0604020202020204" pitchFamily="34" charset="0"/>
               </a:rPr>
-              <a:t>Elle consiste en un bouton qui serait mis sur les fauteuils roulant et qui permettrait l’envoi d’un message avec la position grâce au téléphone relié en Bluetooth a ce dernier.</a:t>
+              <a:t>Elle consiste en un bouton qui serait mis sur les fauteuils roulant ou fixé a une poche et qui permettrait l’envoi d’un message avec la position grâce au téléphone relié en Bluetooth à ce dernier.</a:t>
             </a:r>
           </a:p>
           <a:p>
@@ -9946,7 +9954,7 @@
                 <a:latin typeface="Franklin Gothic Medium" panose="020B0603020102020204" pitchFamily="34" charset="0"/>
                 <a:cs typeface="Arial" panose="020B0604020202020204" pitchFamily="34" charset="0"/>
               </a:rPr>
-              <a:t>Un Shield Bluetooth</a:t>
+              <a:t>Un Shield Bluetooth (compatible tout Arduino et Raspberry pi)</a:t>
             </a:r>
           </a:p>
           <a:p>
@@ -9982,7 +9990,7 @@
                 <a:latin typeface="Franklin Gothic Medium" panose="020B0603020102020204" pitchFamily="34" charset="0"/>
                 <a:cs typeface="Arial" panose="020B0604020202020204" pitchFamily="34" charset="0"/>
               </a:rPr>
-              <a:t>Câbles</a:t>
+              <a:t>Fils électriques</a:t>
             </a:r>
           </a:p>
           <a:p>
@@ -9995,12 +10003,29 @@
             </a:r>
           </a:p>
           <a:p>
-            <a:r>
-              <a:rPr lang="fr-FR">
+            <a:pPr lvl="1"/>
+            <a:r>
+              <a:rPr lang="fr-FR" dirty="0">
                 <a:latin typeface="Franklin Gothic Medium" panose="020B0603020102020204" pitchFamily="34" charset="0"/>
                 <a:cs typeface="Arial" panose="020B0604020202020204" pitchFamily="34" charset="0"/>
               </a:rPr>
-              <a:t>Une mini breadBoard</a:t>
+              <a:t>5 Volt et minimum 1 Ampère</a:t>
+            </a:r>
+          </a:p>
+          <a:p>
+            <a:r>
+              <a:rPr lang="fr-FR" dirty="0">
+                <a:latin typeface="Franklin Gothic Medium" panose="020B0603020102020204" pitchFamily="34" charset="0"/>
+                <a:cs typeface="Arial" panose="020B0604020202020204" pitchFamily="34" charset="0"/>
+              </a:rPr>
+              <a:t>Une mini </a:t>
+            </a:r>
+            <a:r>
+              <a:rPr lang="fr-FR" dirty="0" err="1">
+                <a:latin typeface="Franklin Gothic Medium" panose="020B0603020102020204" pitchFamily="34" charset="0"/>
+                <a:cs typeface="Arial" panose="020B0604020202020204" pitchFamily="34" charset="0"/>
+              </a:rPr>
+              <a:t>breadBoard</a:t>
             </a:r>
             <a:endParaRPr lang="fr-FR" dirty="0">
               <a:latin typeface="Franklin Gothic Medium" panose="020B0603020102020204" pitchFamily="34" charset="0"/>
@@ -10150,7 +10175,7 @@
                 <a:latin typeface="Franklin Gothic Medium" panose="020B0603020102020204" pitchFamily="34" charset="0"/>
                 <a:cs typeface="Arial" panose="020B0604020202020204" pitchFamily="34" charset="0"/>
               </a:rPr>
-              <a:t>Configurer le téléphone avec le numéro à contacter</a:t>
+              <a:t>Configurer dans l’application le numéro de téléphone a contacter.</a:t>
             </a:r>
           </a:p>
           <a:p>
@@ -10171,7 +10196,7 @@
                 <a:latin typeface="Franklin Gothic Medium" panose="020B0603020102020204" pitchFamily="34" charset="0"/>
                 <a:cs typeface="Arial" panose="020B0604020202020204" pitchFamily="34" charset="0"/>
               </a:rPr>
-              <a:t>Connexion à la télécommande</a:t>
+              <a:t>Depuis l’application connecter son téléphone à la télécommande</a:t>
             </a:r>
           </a:p>
           <a:p>
@@ -10201,7 +10226,7 @@
                 <a:latin typeface="Franklin Gothic Medium" panose="020B0603020102020204" pitchFamily="34" charset="0"/>
                 <a:cs typeface="Arial" panose="020B0604020202020204" pitchFamily="34" charset="0"/>
               </a:rPr>
-              <a:t>Activer la 4G pour avoir l’adresse</a:t>
+              <a:t>Activer la 3G/4G pour avoir l’adresse, sinon seul la localisation GPS sera envoyé</a:t>
             </a:r>
           </a:p>
           <a:p>
@@ -10217,15 +10242,22 @@
             </a:r>
           </a:p>
           <a:p>
-            <a:pPr marL="0" indent="0">
-              <a:buNone/>
-            </a:pPr>
             <a:r>
               <a:rPr lang="fr-FR" dirty="0">
                 <a:latin typeface="Franklin Gothic Medium" panose="020B0603020102020204" pitchFamily="34" charset="0"/>
                 <a:cs typeface="Arial" panose="020B0604020202020204" pitchFamily="34" charset="0"/>
               </a:rPr>
-              <a:t>Quand la personne a un problème il suffit qu’elle appuie sur le bouton</a:t>
+              <a:t>La solution est opérationnel et utilisable:</a:t>
+            </a:r>
+          </a:p>
+          <a:p>
+            <a:pPr lvl="1"/>
+            <a:r>
+              <a:rPr lang="fr-FR" dirty="0">
+                <a:latin typeface="Franklin Gothic Medium" panose="020B0603020102020204" pitchFamily="34" charset="0"/>
+                <a:cs typeface="Arial" panose="020B0604020202020204" pitchFamily="34" charset="0"/>
+              </a:rPr>
+              <a:t>Quand l’utilisateur appui sur le bouton connecté, la personne référente à contacter recevra un SMS avec au minimum la localisation GPS</a:t>
             </a:r>
           </a:p>
           <a:p>
@@ -10729,7 +10761,7 @@
         <p:spPr>
           <a:xfrm>
             <a:off x="2185300" y="2139950"/>
-            <a:ext cx="5445901" cy="3494442"/>
+            <a:ext cx="5445901" cy="4446380"/>
           </a:xfrm>
         </p:spPr>
         <p:txBody>
@@ -10746,7 +10778,7 @@
           <a:p>
             <a:r>
               <a:rPr lang="fr-FR" dirty="0"/>
-              <a:t>Créer un projet avec votre version de téléphone</a:t>
+              <a:t>Créer un projet avec votre version de téléphone (Conseil Android 4.4 car compatible avec la grande majorité des téléphones Android)</a:t>
             </a:r>
           </a:p>
           <a:p>
@@ -10766,7 +10798,7 @@
             <a:pPr lvl="2"/>
             <a:r>
               <a:rPr lang="fr-FR" dirty="0"/>
-              <a:t>Les fichiers a l’intérieur permettront de modéliser l’affichage</a:t>
+              <a:t>Les fichiers à l’intérieur permettront de modéliser l’affichage</a:t>
             </a:r>
           </a:p>
           <a:p>
@@ -10780,7 +10812,15 @@
             <a:pPr lvl="2"/>
             <a:r>
               <a:rPr lang="fr-FR" dirty="0"/>
-              <a:t>Les fichiers a l’intérieur vont servir a faire les interactions avec l’affichage</a:t>
+              <a:t>Les fichiers à l’intérieur vont </a:t>
+            </a:r>
+            <a:r>
+              <a:rPr lang="fr-FR"/>
+              <a:t>servir à </a:t>
+            </a:r>
+            <a:r>
+              <a:rPr lang="fr-FR" dirty="0"/>
+              <a:t>faire les interactions avec l’affichage</a:t>
             </a:r>
           </a:p>
         </p:txBody>
@@ -10924,13 +10964,29 @@
           <a:p>
             <a:r>
               <a:rPr lang="fr-FR" dirty="0"/>
-              <a:t>Dans le layout principale positionner un vertical layout afin que l’affichage ne bouge plus, puis il suffit de placer vos élément a l’intérieur de ce dernier</a:t>
-            </a:r>
-          </a:p>
-          <a:p>
+              <a:t>Dans le </a:t>
+            </a:r>
+            <a:r>
+              <a:rPr lang="fr-FR" dirty="0" err="1"/>
+              <a:t>layout</a:t>
+            </a:r>
             <a:r>
               <a:rPr lang="fr-FR" dirty="0"/>
-              <a:t>Pour mettre une action sur un bouton il faut récupérer son id puis écrire ceci dans le code java</a:t>
+              <a:t> principal positionner un vertical </a:t>
+            </a:r>
+            <a:r>
+              <a:rPr lang="fr-FR" dirty="0" err="1"/>
+              <a:t>layout</a:t>
+            </a:r>
+            <a:r>
+              <a:rPr lang="fr-FR" dirty="0"/>
+              <a:t> (dans le listing) afin que l’affichage ne bouge plus, puis il suffit de placer vos élément à l’intérieur de ce dernier</a:t>
+            </a:r>
+          </a:p>
+          <a:p>
+            <a:r>
+              <a:rPr lang="fr-FR" dirty="0"/>
+              <a:t>Pour mettre une action sur un bouton il faut récupérer son id puis écrire ceci dans le code java (tout ce qui est en rouge est à adapter)</a:t>
             </a:r>
           </a:p>
           <a:p>
@@ -11173,7 +11229,7 @@
                   <a:schemeClr val="tx1"/>
                 </a:solidFill>
               </a:rPr>
-              <a:t>Commandes importante pour débuter</a:t>
+              <a:t>Commandes importantes en C/C++ pour débuter</a:t>
             </a:r>
           </a:p>
           <a:p>
@@ -11283,7 +11339,7 @@
                   <a:schemeClr val="tx1"/>
                 </a:solidFill>
               </a:rPr>
-              <a:t>Déclare un nombre décimale</a:t>
+              <a:t>Déclare un nombre décimal</a:t>
             </a:r>
           </a:p>
           <a:p>
@@ -11305,7 +11361,7 @@
                   <a:schemeClr val="tx1"/>
                 </a:solidFill>
               </a:rPr>
-              <a:t>Déclare une chaine de caractère</a:t>
+              <a:t>Déclare une chaîne de caractère</a:t>
             </a:r>
           </a:p>
           <a:p>

</xml_diff>